<commit_message>
producer_states_diagram_1.0.pdf: create payment subprocess added.
</commit_message>
<xml_diff>
--- a/docs/fsm/producer_states_diagram_1.0.pptx
+++ b/docs/fsm/producer_states_diagram_1.0.pptx
@@ -2,12 +2,12 @@
 <file path=ppt/presentation.xml><?xml version="1.0" encoding="utf-8"?>
 <p:presentation xmlns:a="http://schemas.openxmlformats.org/drawingml/2006/main" xmlns:r="http://schemas.openxmlformats.org/officeDocument/2006/relationships" xmlns:p="http://schemas.openxmlformats.org/presentationml/2006/main" saveSubsetFonts="1">
   <p:sldMasterIdLst>
-    <p:sldMasterId id="2147483648" r:id="rId1"/>
+    <p:sldMasterId id="2147483672" r:id="rId1"/>
   </p:sldMasterIdLst>
   <p:sldIdLst>
     <p:sldId id="256" r:id="rId2"/>
   </p:sldIdLst>
-  <p:sldSz cx="12192000" cy="6858000"/>
+  <p:sldSz cx="16459200" cy="6858000"/>
   <p:notesSz cx="6858000" cy="9144000"/>
   <p:defaultTextStyle>
     <a:defPPr>
@@ -104,6 +104,11 @@
       </a:defRPr>
     </a:lvl9pPr>
   </p:defaultTextStyle>
+  <p:extLst>
+    <p:ext uri="{EFAFB233-063F-42B5-8137-9DF3F51BA10A}">
+      <p15:sldGuideLst xmlns:p15="http://schemas.microsoft.com/office/powerpoint/2012/main"/>
+    </p:ext>
+  </p:extLst>
 </p:presentation>
 </file>
 
@@ -136,8 +141,8 @@
         </p:nvSpPr>
         <p:spPr>
           <a:xfrm>
-            <a:off x="1524000" y="1122363"/>
-            <a:ext cx="9144000" cy="2387600"/>
+            <a:off x="2057400" y="1122363"/>
+            <a:ext cx="12344400" cy="2387600"/>
           </a:xfrm>
         </p:spPr>
         <p:txBody>
@@ -152,7 +157,7 @@
               <a:rPr lang="en-US" smtClean="0"/>
               <a:t>Click to edit Master title style</a:t>
             </a:r>
-            <a:endParaRPr lang="tr-TR"/>
+            <a:endParaRPr lang="en-US" dirty="0"/>
           </a:p>
         </p:txBody>
       </p:sp>
@@ -168,8 +173,8 @@
         </p:nvSpPr>
         <p:spPr>
           <a:xfrm>
-            <a:off x="1524000" y="3602038"/>
-            <a:ext cx="9144000" cy="1655762"/>
+            <a:off x="2057400" y="3602038"/>
+            <a:ext cx="12344400" cy="1655762"/>
           </a:xfrm>
         </p:spPr>
         <p:txBody>
@@ -217,7 +222,7 @@
               <a:rPr lang="en-US" smtClean="0"/>
               <a:t>Click to edit Master subtitle style</a:t>
             </a:r>
-            <a:endParaRPr lang="tr-TR"/>
+            <a:endParaRPr lang="en-US" dirty="0"/>
           </a:p>
         </p:txBody>
       </p:sp>
@@ -238,7 +243,7 @@
           <a:p>
             <a:fld id="{781FDEF2-EC42-4EDA-B2D0-495200E6B1B0}" type="datetimeFigureOut">
               <a:rPr lang="tr-TR" smtClean="0"/>
-              <a:t>19.03.2021</a:t>
+              <a:t>20.03.2021</a:t>
             </a:fld>
             <a:endParaRPr lang="tr-TR"/>
           </a:p>
@@ -289,7 +294,7 @@
     </p:spTree>
     <p:extLst>
       <p:ext uri="{BB962C8B-B14F-4D97-AF65-F5344CB8AC3E}">
-        <p14:creationId xmlns:p14="http://schemas.microsoft.com/office/powerpoint/2010/main" val="226651920"/>
+        <p14:creationId xmlns:p14="http://schemas.microsoft.com/office/powerpoint/2010/main" val="505150205"/>
       </p:ext>
     </p:extLst>
   </p:cSld>
@@ -335,7 +340,7 @@
               <a:rPr lang="en-US" smtClean="0"/>
               <a:t>Click to edit Master title style</a:t>
             </a:r>
-            <a:endParaRPr lang="tr-TR"/>
+            <a:endParaRPr lang="en-US" dirty="0"/>
           </a:p>
         </p:txBody>
       </p:sp>
@@ -387,7 +392,7 @@
               <a:rPr lang="en-US" smtClean="0"/>
               <a:t>Fifth level</a:t>
             </a:r>
-            <a:endParaRPr lang="tr-TR"/>
+            <a:endParaRPr lang="en-US" dirty="0"/>
           </a:p>
         </p:txBody>
       </p:sp>
@@ -408,7 +413,7 @@
           <a:p>
             <a:fld id="{781FDEF2-EC42-4EDA-B2D0-495200E6B1B0}" type="datetimeFigureOut">
               <a:rPr lang="tr-TR" smtClean="0"/>
-              <a:t>19.03.2021</a:t>
+              <a:t>20.03.2021</a:t>
             </a:fld>
             <a:endParaRPr lang="tr-TR"/>
           </a:p>
@@ -459,7 +464,7 @@
     </p:spTree>
     <p:extLst>
       <p:ext uri="{BB962C8B-B14F-4D97-AF65-F5344CB8AC3E}">
-        <p14:creationId xmlns:p14="http://schemas.microsoft.com/office/powerpoint/2010/main" val="2110042826"/>
+        <p14:creationId xmlns:p14="http://schemas.microsoft.com/office/powerpoint/2010/main" val="503226485"/>
       </p:ext>
     </p:extLst>
   </p:cSld>
@@ -498,8 +503,8 @@
         </p:nvSpPr>
         <p:spPr>
           <a:xfrm>
-            <a:off x="8724900" y="365125"/>
-            <a:ext cx="2628900" cy="5811838"/>
+            <a:off x="11778615" y="365125"/>
+            <a:ext cx="3549015" cy="5811838"/>
           </a:xfrm>
         </p:spPr>
         <p:txBody>
@@ -510,7 +515,7 @@
               <a:rPr lang="en-US" smtClean="0"/>
               <a:t>Click to edit Master title style</a:t>
             </a:r>
-            <a:endParaRPr lang="tr-TR"/>
+            <a:endParaRPr lang="en-US" dirty="0"/>
           </a:p>
         </p:txBody>
       </p:sp>
@@ -526,8 +531,8 @@
         </p:nvSpPr>
         <p:spPr>
           <a:xfrm>
-            <a:off x="838200" y="365125"/>
-            <a:ext cx="7734300" cy="5811838"/>
+            <a:off x="1131570" y="365125"/>
+            <a:ext cx="10441305" cy="5811838"/>
           </a:xfrm>
         </p:spPr>
         <p:txBody>
@@ -567,7 +572,7 @@
               <a:rPr lang="en-US" smtClean="0"/>
               <a:t>Fifth level</a:t>
             </a:r>
-            <a:endParaRPr lang="tr-TR"/>
+            <a:endParaRPr lang="en-US" dirty="0"/>
           </a:p>
         </p:txBody>
       </p:sp>
@@ -588,7 +593,7 @@
           <a:p>
             <a:fld id="{781FDEF2-EC42-4EDA-B2D0-495200E6B1B0}" type="datetimeFigureOut">
               <a:rPr lang="tr-TR" smtClean="0"/>
-              <a:t>19.03.2021</a:t>
+              <a:t>20.03.2021</a:t>
             </a:fld>
             <a:endParaRPr lang="tr-TR"/>
           </a:p>
@@ -639,7 +644,7 @@
     </p:spTree>
     <p:extLst>
       <p:ext uri="{BB962C8B-B14F-4D97-AF65-F5344CB8AC3E}">
-        <p14:creationId xmlns:p14="http://schemas.microsoft.com/office/powerpoint/2010/main" val="2884612832"/>
+        <p14:creationId xmlns:p14="http://schemas.microsoft.com/office/powerpoint/2010/main" val="2321493628"/>
       </p:ext>
     </p:extLst>
   </p:cSld>
@@ -685,7 +690,7 @@
               <a:rPr lang="en-US" smtClean="0"/>
               <a:t>Click to edit Master title style</a:t>
             </a:r>
-            <a:endParaRPr lang="tr-TR"/>
+            <a:endParaRPr lang="en-US" dirty="0"/>
           </a:p>
         </p:txBody>
       </p:sp>
@@ -737,7 +742,7 @@
               <a:rPr lang="en-US" smtClean="0"/>
               <a:t>Fifth level</a:t>
             </a:r>
-            <a:endParaRPr lang="tr-TR"/>
+            <a:endParaRPr lang="en-US" dirty="0"/>
           </a:p>
         </p:txBody>
       </p:sp>
@@ -758,7 +763,7 @@
           <a:p>
             <a:fld id="{781FDEF2-EC42-4EDA-B2D0-495200E6B1B0}" type="datetimeFigureOut">
               <a:rPr lang="tr-TR" smtClean="0"/>
-              <a:t>19.03.2021</a:t>
+              <a:t>20.03.2021</a:t>
             </a:fld>
             <a:endParaRPr lang="tr-TR"/>
           </a:p>
@@ -809,7 +814,7 @@
     </p:spTree>
     <p:extLst>
       <p:ext uri="{BB962C8B-B14F-4D97-AF65-F5344CB8AC3E}">
-        <p14:creationId xmlns:p14="http://schemas.microsoft.com/office/powerpoint/2010/main" val="2144303522"/>
+        <p14:creationId xmlns:p14="http://schemas.microsoft.com/office/powerpoint/2010/main" val="2261908733"/>
       </p:ext>
     </p:extLst>
   </p:cSld>
@@ -848,8 +853,8 @@
         </p:nvSpPr>
         <p:spPr>
           <a:xfrm>
-            <a:off x="831850" y="1709738"/>
-            <a:ext cx="10515600" cy="2852737"/>
+            <a:off x="1122998" y="1709739"/>
+            <a:ext cx="14196060" cy="2852737"/>
           </a:xfrm>
         </p:spPr>
         <p:txBody>
@@ -864,7 +869,7 @@
               <a:rPr lang="en-US" smtClean="0"/>
               <a:t>Click to edit Master title style</a:t>
             </a:r>
-            <a:endParaRPr lang="tr-TR"/>
+            <a:endParaRPr lang="en-US" dirty="0"/>
           </a:p>
         </p:txBody>
       </p:sp>
@@ -880,8 +885,8 @@
         </p:nvSpPr>
         <p:spPr>
           <a:xfrm>
-            <a:off x="831850" y="4589463"/>
-            <a:ext cx="10515600" cy="1500187"/>
+            <a:off x="1122998" y="4589464"/>
+            <a:ext cx="14196060" cy="1500187"/>
           </a:xfrm>
         </p:spPr>
         <p:txBody>
@@ -1004,7 +1009,7 @@
           <a:p>
             <a:fld id="{781FDEF2-EC42-4EDA-B2D0-495200E6B1B0}" type="datetimeFigureOut">
               <a:rPr lang="tr-TR" smtClean="0"/>
-              <a:t>19.03.2021</a:t>
+              <a:t>20.03.2021</a:t>
             </a:fld>
             <a:endParaRPr lang="tr-TR"/>
           </a:p>
@@ -1055,7 +1060,7 @@
     </p:spTree>
     <p:extLst>
       <p:ext uri="{BB962C8B-B14F-4D97-AF65-F5344CB8AC3E}">
-        <p14:creationId xmlns:p14="http://schemas.microsoft.com/office/powerpoint/2010/main" val="1869368440"/>
+        <p14:creationId xmlns:p14="http://schemas.microsoft.com/office/powerpoint/2010/main" val="2577964461"/>
       </p:ext>
     </p:extLst>
   </p:cSld>
@@ -1101,7 +1106,7 @@
               <a:rPr lang="en-US" smtClean="0"/>
               <a:t>Click to edit Master title style</a:t>
             </a:r>
-            <a:endParaRPr lang="tr-TR"/>
+            <a:endParaRPr lang="en-US" dirty="0"/>
           </a:p>
         </p:txBody>
       </p:sp>
@@ -1117,8 +1122,8 @@
         </p:nvSpPr>
         <p:spPr>
           <a:xfrm>
-            <a:off x="838200" y="1825625"/>
-            <a:ext cx="5181600" cy="4351338"/>
+            <a:off x="1131570" y="1825625"/>
+            <a:ext cx="6995160" cy="4351338"/>
           </a:xfrm>
         </p:spPr>
         <p:txBody>
@@ -1158,7 +1163,7 @@
               <a:rPr lang="en-US" smtClean="0"/>
               <a:t>Fifth level</a:t>
             </a:r>
-            <a:endParaRPr lang="tr-TR"/>
+            <a:endParaRPr lang="en-US" dirty="0"/>
           </a:p>
         </p:txBody>
       </p:sp>
@@ -1174,8 +1179,8 @@
         </p:nvSpPr>
         <p:spPr>
           <a:xfrm>
-            <a:off x="6172200" y="1825625"/>
-            <a:ext cx="5181600" cy="4351338"/>
+            <a:off x="8332470" y="1825625"/>
+            <a:ext cx="6995160" cy="4351338"/>
           </a:xfrm>
         </p:spPr>
         <p:txBody>
@@ -1215,7 +1220,7 @@
               <a:rPr lang="en-US" smtClean="0"/>
               <a:t>Fifth level</a:t>
             </a:r>
-            <a:endParaRPr lang="tr-TR"/>
+            <a:endParaRPr lang="en-US" dirty="0"/>
           </a:p>
         </p:txBody>
       </p:sp>
@@ -1236,7 +1241,7 @@
           <a:p>
             <a:fld id="{781FDEF2-EC42-4EDA-B2D0-495200E6B1B0}" type="datetimeFigureOut">
               <a:rPr lang="tr-TR" smtClean="0"/>
-              <a:t>19.03.2021</a:t>
+              <a:t>20.03.2021</a:t>
             </a:fld>
             <a:endParaRPr lang="tr-TR"/>
           </a:p>
@@ -1287,7 +1292,7 @@
     </p:spTree>
     <p:extLst>
       <p:ext uri="{BB962C8B-B14F-4D97-AF65-F5344CB8AC3E}">
-        <p14:creationId xmlns:p14="http://schemas.microsoft.com/office/powerpoint/2010/main" val="1807764302"/>
+        <p14:creationId xmlns:p14="http://schemas.microsoft.com/office/powerpoint/2010/main" val="1052619234"/>
       </p:ext>
     </p:extLst>
   </p:cSld>
@@ -1326,8 +1331,8 @@
         </p:nvSpPr>
         <p:spPr>
           <a:xfrm>
-            <a:off x="839788" y="365125"/>
-            <a:ext cx="10515600" cy="1325563"/>
+            <a:off x="1133714" y="365126"/>
+            <a:ext cx="14196060" cy="1325563"/>
           </a:xfrm>
         </p:spPr>
         <p:txBody>
@@ -1338,7 +1343,7 @@
               <a:rPr lang="en-US" smtClean="0"/>
               <a:t>Click to edit Master title style</a:t>
             </a:r>
-            <a:endParaRPr lang="tr-TR"/>
+            <a:endParaRPr lang="en-US" dirty="0"/>
           </a:p>
         </p:txBody>
       </p:sp>
@@ -1354,8 +1359,8 @@
         </p:nvSpPr>
         <p:spPr>
           <a:xfrm>
-            <a:off x="839788" y="1681163"/>
-            <a:ext cx="5157787" cy="823912"/>
+            <a:off x="1133715" y="1681163"/>
+            <a:ext cx="6963012" cy="823912"/>
           </a:xfrm>
         </p:spPr>
         <p:txBody>
@@ -1419,8 +1424,8 @@
         </p:nvSpPr>
         <p:spPr>
           <a:xfrm>
-            <a:off x="839788" y="2505075"/>
-            <a:ext cx="5157787" cy="3684588"/>
+            <a:off x="1133715" y="2505075"/>
+            <a:ext cx="6963012" cy="3684588"/>
           </a:xfrm>
         </p:spPr>
         <p:txBody>
@@ -1460,7 +1465,7 @@
               <a:rPr lang="en-US" smtClean="0"/>
               <a:t>Fifth level</a:t>
             </a:r>
-            <a:endParaRPr lang="tr-TR"/>
+            <a:endParaRPr lang="en-US" dirty="0"/>
           </a:p>
         </p:txBody>
       </p:sp>
@@ -1476,8 +1481,8 @@
         </p:nvSpPr>
         <p:spPr>
           <a:xfrm>
-            <a:off x="6172200" y="1681163"/>
-            <a:ext cx="5183188" cy="823912"/>
+            <a:off x="8332470" y="1681163"/>
+            <a:ext cx="6997304" cy="823912"/>
           </a:xfrm>
         </p:spPr>
         <p:txBody>
@@ -1541,8 +1546,8 @@
         </p:nvSpPr>
         <p:spPr>
           <a:xfrm>
-            <a:off x="6172200" y="2505075"/>
-            <a:ext cx="5183188" cy="3684588"/>
+            <a:off x="8332470" y="2505075"/>
+            <a:ext cx="6997304" cy="3684588"/>
           </a:xfrm>
         </p:spPr>
         <p:txBody>
@@ -1582,7 +1587,7 @@
               <a:rPr lang="en-US" smtClean="0"/>
               <a:t>Fifth level</a:t>
             </a:r>
-            <a:endParaRPr lang="tr-TR"/>
+            <a:endParaRPr lang="en-US" dirty="0"/>
           </a:p>
         </p:txBody>
       </p:sp>
@@ -1603,7 +1608,7 @@
           <a:p>
             <a:fld id="{781FDEF2-EC42-4EDA-B2D0-495200E6B1B0}" type="datetimeFigureOut">
               <a:rPr lang="tr-TR" smtClean="0"/>
-              <a:t>19.03.2021</a:t>
+              <a:t>20.03.2021</a:t>
             </a:fld>
             <a:endParaRPr lang="tr-TR"/>
           </a:p>
@@ -1654,7 +1659,7 @@
     </p:spTree>
     <p:extLst>
       <p:ext uri="{BB962C8B-B14F-4D97-AF65-F5344CB8AC3E}">
-        <p14:creationId xmlns:p14="http://schemas.microsoft.com/office/powerpoint/2010/main" val="2616701752"/>
+        <p14:creationId xmlns:p14="http://schemas.microsoft.com/office/powerpoint/2010/main" val="579310047"/>
       </p:ext>
     </p:extLst>
   </p:cSld>
@@ -1700,7 +1705,7 @@
               <a:rPr lang="en-US" smtClean="0"/>
               <a:t>Click to edit Master title style</a:t>
             </a:r>
-            <a:endParaRPr lang="tr-TR"/>
+            <a:endParaRPr lang="en-US" dirty="0"/>
           </a:p>
         </p:txBody>
       </p:sp>
@@ -1721,7 +1726,7 @@
           <a:p>
             <a:fld id="{781FDEF2-EC42-4EDA-B2D0-495200E6B1B0}" type="datetimeFigureOut">
               <a:rPr lang="tr-TR" smtClean="0"/>
-              <a:t>19.03.2021</a:t>
+              <a:t>20.03.2021</a:t>
             </a:fld>
             <a:endParaRPr lang="tr-TR"/>
           </a:p>
@@ -1772,7 +1777,7 @@
     </p:spTree>
     <p:extLst>
       <p:ext uri="{BB962C8B-B14F-4D97-AF65-F5344CB8AC3E}">
-        <p14:creationId xmlns:p14="http://schemas.microsoft.com/office/powerpoint/2010/main" val="1075250226"/>
+        <p14:creationId xmlns:p14="http://schemas.microsoft.com/office/powerpoint/2010/main" val="2110029358"/>
       </p:ext>
     </p:extLst>
   </p:cSld>
@@ -1816,7 +1821,7 @@
           <a:p>
             <a:fld id="{781FDEF2-EC42-4EDA-B2D0-495200E6B1B0}" type="datetimeFigureOut">
               <a:rPr lang="tr-TR" smtClean="0"/>
-              <a:t>19.03.2021</a:t>
+              <a:t>20.03.2021</a:t>
             </a:fld>
             <a:endParaRPr lang="tr-TR"/>
           </a:p>
@@ -1867,7 +1872,7 @@
     </p:spTree>
     <p:extLst>
       <p:ext uri="{BB962C8B-B14F-4D97-AF65-F5344CB8AC3E}">
-        <p14:creationId xmlns:p14="http://schemas.microsoft.com/office/powerpoint/2010/main" val="1546094492"/>
+        <p14:creationId xmlns:p14="http://schemas.microsoft.com/office/powerpoint/2010/main" val="886377962"/>
       </p:ext>
     </p:extLst>
   </p:cSld>
@@ -1906,8 +1911,8 @@
         </p:nvSpPr>
         <p:spPr>
           <a:xfrm>
-            <a:off x="839788" y="457200"/>
-            <a:ext cx="3932237" cy="1600200"/>
+            <a:off x="1133714" y="457200"/>
+            <a:ext cx="5308520" cy="1600200"/>
           </a:xfrm>
         </p:spPr>
         <p:txBody>
@@ -1922,7 +1927,7 @@
               <a:rPr lang="en-US" smtClean="0"/>
               <a:t>Click to edit Master title style</a:t>
             </a:r>
-            <a:endParaRPr lang="tr-TR"/>
+            <a:endParaRPr lang="en-US" dirty="0"/>
           </a:p>
         </p:txBody>
       </p:sp>
@@ -1938,8 +1943,8 @@
         </p:nvSpPr>
         <p:spPr>
           <a:xfrm>
-            <a:off x="5183188" y="987425"/>
-            <a:ext cx="6172200" cy="4873625"/>
+            <a:off x="6997304" y="987426"/>
+            <a:ext cx="8332470" cy="4873625"/>
           </a:xfrm>
         </p:spPr>
         <p:txBody>
@@ -2007,7 +2012,7 @@
               <a:rPr lang="en-US" smtClean="0"/>
               <a:t>Fifth level</a:t>
             </a:r>
-            <a:endParaRPr lang="tr-TR"/>
+            <a:endParaRPr lang="en-US" dirty="0"/>
           </a:p>
         </p:txBody>
       </p:sp>
@@ -2023,8 +2028,8 @@
         </p:nvSpPr>
         <p:spPr>
           <a:xfrm>
-            <a:off x="839788" y="2057400"/>
-            <a:ext cx="3932237" cy="3811588"/>
+            <a:off x="1133714" y="2057400"/>
+            <a:ext cx="5308520" cy="3811588"/>
           </a:xfrm>
         </p:spPr>
         <p:txBody>
@@ -2093,7 +2098,7 @@
           <a:p>
             <a:fld id="{781FDEF2-EC42-4EDA-B2D0-495200E6B1B0}" type="datetimeFigureOut">
               <a:rPr lang="tr-TR" smtClean="0"/>
-              <a:t>19.03.2021</a:t>
+              <a:t>20.03.2021</a:t>
             </a:fld>
             <a:endParaRPr lang="tr-TR"/>
           </a:p>
@@ -2144,7 +2149,7 @@
     </p:spTree>
     <p:extLst>
       <p:ext uri="{BB962C8B-B14F-4D97-AF65-F5344CB8AC3E}">
-        <p14:creationId xmlns:p14="http://schemas.microsoft.com/office/powerpoint/2010/main" val="2821120217"/>
+        <p14:creationId xmlns:p14="http://schemas.microsoft.com/office/powerpoint/2010/main" val="3682564575"/>
       </p:ext>
     </p:extLst>
   </p:cSld>
@@ -2183,8 +2188,8 @@
         </p:nvSpPr>
         <p:spPr>
           <a:xfrm>
-            <a:off x="839788" y="457200"/>
-            <a:ext cx="3932237" cy="1600200"/>
+            <a:off x="1133714" y="457200"/>
+            <a:ext cx="5308520" cy="1600200"/>
           </a:xfrm>
         </p:spPr>
         <p:txBody>
@@ -2199,7 +2204,7 @@
               <a:rPr lang="en-US" smtClean="0"/>
               <a:t>Click to edit Master title style</a:t>
             </a:r>
-            <a:endParaRPr lang="tr-TR"/>
+            <a:endParaRPr lang="en-US" dirty="0"/>
           </a:p>
         </p:txBody>
       </p:sp>
@@ -2207,7 +2212,7 @@
         <p:nvSpPr>
           <p:cNvPr id="3" name="Picture Placeholder 2"/>
           <p:cNvSpPr>
-            <a:spLocks noGrp="1"/>
+            <a:spLocks noGrp="1" noChangeAspect="1"/>
           </p:cNvSpPr>
           <p:nvPr>
             <p:ph type="pic" idx="1"/>
@@ -2215,12 +2220,12 @@
         </p:nvSpPr>
         <p:spPr>
           <a:xfrm>
-            <a:off x="5183188" y="987425"/>
-            <a:ext cx="6172200" cy="4873625"/>
-          </a:xfrm>
-        </p:spPr>
-        <p:txBody>
-          <a:bodyPr/>
+            <a:off x="6997304" y="987426"/>
+            <a:ext cx="8332470" cy="4873625"/>
+          </a:xfrm>
+        </p:spPr>
+        <p:txBody>
+          <a:bodyPr anchor="t"/>
           <a:lstStyle>
             <a:lvl1pPr marL="0" indent="0">
               <a:buNone/>
@@ -2260,7 +2265,11 @@
             </a:lvl9pPr>
           </a:lstStyle>
           <a:p>
-            <a:endParaRPr lang="tr-TR"/>
+            <a:r>
+              <a:rPr lang="en-US" smtClean="0"/>
+              <a:t>Click icon to add picture</a:t>
+            </a:r>
+            <a:endParaRPr lang="en-US" dirty="0"/>
           </a:p>
         </p:txBody>
       </p:sp>
@@ -2276,8 +2285,8 @@
         </p:nvSpPr>
         <p:spPr>
           <a:xfrm>
-            <a:off x="839788" y="2057400"/>
-            <a:ext cx="3932237" cy="3811588"/>
+            <a:off x="1133714" y="2057400"/>
+            <a:ext cx="5308520" cy="3811588"/>
           </a:xfrm>
         </p:spPr>
         <p:txBody>
@@ -2346,7 +2355,7 @@
           <a:p>
             <a:fld id="{781FDEF2-EC42-4EDA-B2D0-495200E6B1B0}" type="datetimeFigureOut">
               <a:rPr lang="tr-TR" smtClean="0"/>
-              <a:t>19.03.2021</a:t>
+              <a:t>20.03.2021</a:t>
             </a:fld>
             <a:endParaRPr lang="tr-TR"/>
           </a:p>
@@ -2397,7 +2406,7 @@
     </p:spTree>
     <p:extLst>
       <p:ext uri="{BB962C8B-B14F-4D97-AF65-F5344CB8AC3E}">
-        <p14:creationId xmlns:p14="http://schemas.microsoft.com/office/powerpoint/2010/main" val="3731837846"/>
+        <p14:creationId xmlns:p14="http://schemas.microsoft.com/office/powerpoint/2010/main" val="355512722"/>
       </p:ext>
     </p:extLst>
   </p:cSld>
@@ -2441,8 +2450,8 @@
         </p:nvSpPr>
         <p:spPr>
           <a:xfrm>
-            <a:off x="838200" y="365125"/>
-            <a:ext cx="10515600" cy="1325563"/>
+            <a:off x="1131570" y="365126"/>
+            <a:ext cx="14196060" cy="1325563"/>
           </a:xfrm>
           <a:prstGeom prst="rect">
             <a:avLst/>
@@ -2458,7 +2467,7 @@
               <a:rPr lang="en-US" smtClean="0"/>
               <a:t>Click to edit Master title style</a:t>
             </a:r>
-            <a:endParaRPr lang="tr-TR"/>
+            <a:endParaRPr lang="en-US" dirty="0"/>
           </a:p>
         </p:txBody>
       </p:sp>
@@ -2474,8 +2483,8 @@
         </p:nvSpPr>
         <p:spPr>
           <a:xfrm>
-            <a:off x="838200" y="1825625"/>
-            <a:ext cx="10515600" cy="4351338"/>
+            <a:off x="1131570" y="1825625"/>
+            <a:ext cx="14196060" cy="4351338"/>
           </a:xfrm>
           <a:prstGeom prst="rect">
             <a:avLst/>
@@ -2520,7 +2529,7 @@
               <a:rPr lang="en-US" smtClean="0"/>
               <a:t>Fifth level</a:t>
             </a:r>
-            <a:endParaRPr lang="tr-TR"/>
+            <a:endParaRPr lang="en-US" dirty="0"/>
           </a:p>
         </p:txBody>
       </p:sp>
@@ -2536,8 +2545,8 @@
         </p:nvSpPr>
         <p:spPr>
           <a:xfrm>
-            <a:off x="838200" y="6356350"/>
-            <a:ext cx="2743200" cy="365125"/>
+            <a:off x="1131570" y="6356351"/>
+            <a:ext cx="3703320" cy="365125"/>
           </a:xfrm>
           <a:prstGeom prst="rect">
             <a:avLst/>
@@ -2559,7 +2568,7 @@
           <a:p>
             <a:fld id="{781FDEF2-EC42-4EDA-B2D0-495200E6B1B0}" type="datetimeFigureOut">
               <a:rPr lang="tr-TR" smtClean="0"/>
-              <a:t>19.03.2021</a:t>
+              <a:t>20.03.2021</a:t>
             </a:fld>
             <a:endParaRPr lang="tr-TR"/>
           </a:p>
@@ -2577,8 +2586,8 @@
         </p:nvSpPr>
         <p:spPr>
           <a:xfrm>
-            <a:off x="4038600" y="6356350"/>
-            <a:ext cx="4114800" cy="365125"/>
+            <a:off x="5452110" y="6356351"/>
+            <a:ext cx="5554980" cy="365125"/>
           </a:xfrm>
           <a:prstGeom prst="rect">
             <a:avLst/>
@@ -2614,8 +2623,8 @@
         </p:nvSpPr>
         <p:spPr>
           <a:xfrm>
-            <a:off x="8610600" y="6356350"/>
-            <a:ext cx="2743200" cy="365125"/>
+            <a:off x="11624310" y="6356351"/>
+            <a:ext cx="3703320" cy="365125"/>
           </a:xfrm>
           <a:prstGeom prst="rect">
             <a:avLst/>
@@ -2646,23 +2655,23 @@
     </p:spTree>
     <p:extLst>
       <p:ext uri="{BB962C8B-B14F-4D97-AF65-F5344CB8AC3E}">
-        <p14:creationId xmlns:p14="http://schemas.microsoft.com/office/powerpoint/2010/main" val="1460869484"/>
+        <p14:creationId xmlns:p14="http://schemas.microsoft.com/office/powerpoint/2010/main" val="219337813"/>
       </p:ext>
     </p:extLst>
   </p:cSld>
   <p:clrMap bg1="lt1" tx1="dk1" bg2="lt2" tx2="dk2" accent1="accent1" accent2="accent2" accent3="accent3" accent4="accent4" accent5="accent5" accent6="accent6" hlink="hlink" folHlink="folHlink"/>
   <p:sldLayoutIdLst>
-    <p:sldLayoutId id="2147483649" r:id="rId1"/>
-    <p:sldLayoutId id="2147483650" r:id="rId2"/>
-    <p:sldLayoutId id="2147483651" r:id="rId3"/>
-    <p:sldLayoutId id="2147483652" r:id="rId4"/>
-    <p:sldLayoutId id="2147483653" r:id="rId5"/>
-    <p:sldLayoutId id="2147483654" r:id="rId6"/>
-    <p:sldLayoutId id="2147483655" r:id="rId7"/>
-    <p:sldLayoutId id="2147483656" r:id="rId8"/>
-    <p:sldLayoutId id="2147483657" r:id="rId9"/>
-    <p:sldLayoutId id="2147483658" r:id="rId10"/>
-    <p:sldLayoutId id="2147483659" r:id="rId11"/>
+    <p:sldLayoutId id="2147483673" r:id="rId1"/>
+    <p:sldLayoutId id="2147483674" r:id="rId2"/>
+    <p:sldLayoutId id="2147483675" r:id="rId3"/>
+    <p:sldLayoutId id="2147483676" r:id="rId4"/>
+    <p:sldLayoutId id="2147483677" r:id="rId5"/>
+    <p:sldLayoutId id="2147483678" r:id="rId6"/>
+    <p:sldLayoutId id="2147483679" r:id="rId7"/>
+    <p:sldLayoutId id="2147483680" r:id="rId8"/>
+    <p:sldLayoutId id="2147483681" r:id="rId9"/>
+    <p:sldLayoutId id="2147483682" r:id="rId10"/>
+    <p:sldLayoutId id="2147483683" r:id="rId11"/>
   </p:sldLayoutIdLst>
   <p:txStyles>
     <p:titleStyle>
@@ -2850,7 +2859,7 @@
     </p:bodyStyle>
     <p:otherStyle>
       <a:defPPr>
-        <a:defRPr lang="tr-TR"/>
+        <a:defRPr lang="en-US"/>
       </a:defPPr>
       <a:lvl1pPr marL="0" algn="l" defTabSz="914400" rtl="0" eaLnBrk="1" latinLnBrk="0" hangingPunct="1">
         <a:defRPr sz="1800" kern="1200">
@@ -2964,6 +2973,44 @@
           <a:chExt cx="0" cy="0"/>
         </a:xfrm>
       </p:grpSpPr>
+      <p:sp>
+        <p:nvSpPr>
+          <p:cNvPr id="62" name="Rounded Rectangle 61"/>
+          <p:cNvSpPr/>
+          <p:nvPr/>
+        </p:nvSpPr>
+        <p:spPr>
+          <a:xfrm>
+            <a:off x="12700480" y="519418"/>
+            <a:ext cx="3546964" cy="5784933"/>
+          </a:xfrm>
+          <a:prstGeom prst="roundRect">
+            <a:avLst/>
+          </a:prstGeom>
+        </p:spPr>
+        <p:style>
+          <a:lnRef idx="2">
+            <a:schemeClr val="dk1"/>
+          </a:lnRef>
+          <a:fillRef idx="1">
+            <a:schemeClr val="lt1"/>
+          </a:fillRef>
+          <a:effectRef idx="0">
+            <a:schemeClr val="dk1"/>
+          </a:effectRef>
+          <a:fontRef idx="minor">
+            <a:schemeClr val="dk1"/>
+          </a:fontRef>
+        </p:style>
+        <p:txBody>
+          <a:bodyPr rtlCol="0" anchor="ctr"/>
+          <a:lstStyle/>
+          <a:p>
+            <a:pPr algn="ctr"/>
+            <a:endParaRPr lang="tr-TR" sz="1200" dirty="0"/>
+          </a:p>
+        </p:txBody>
+      </p:sp>
       <p:cxnSp>
         <p:nvCxnSpPr>
           <p:cNvPr id="195" name="Elbow Connector 194"/>
@@ -2975,7 +3022,7 @@
         </p:nvCxnSpPr>
         <p:spPr>
           <a:xfrm rot="5400000">
-            <a:off x="5958372" y="391904"/>
+            <a:off x="6470564" y="313979"/>
             <a:ext cx="2914035" cy="6940666"/>
           </a:xfrm>
           <a:prstGeom prst="bentConnector3">
@@ -3010,7 +3057,7 @@
         </p:nvSpPr>
         <p:spPr>
           <a:xfrm>
-            <a:off x="569769" y="699654"/>
+            <a:off x="1081961" y="621731"/>
             <a:ext cx="378691" cy="378691"/>
           </a:xfrm>
           <a:prstGeom prst="ellipse">
@@ -3050,7 +3097,7 @@
         </p:nvSpPr>
         <p:spPr>
           <a:xfrm>
-            <a:off x="5164057" y="1927672"/>
+            <a:off x="5676249" y="1849749"/>
             <a:ext cx="378691" cy="378691"/>
           </a:xfrm>
           <a:prstGeom prst="ellipse">
@@ -3088,7 +3135,7 @@
         </p:nvSpPr>
         <p:spPr>
           <a:xfrm>
-            <a:off x="5258729" y="2022344"/>
+            <a:off x="5770919" y="1944419"/>
             <a:ext cx="189346" cy="189346"/>
           </a:xfrm>
           <a:prstGeom prst="ellipse">
@@ -3128,7 +3175,7 @@
         </p:nvSpPr>
         <p:spPr>
           <a:xfrm>
-            <a:off x="2179783" y="390235"/>
+            <a:off x="2691975" y="312312"/>
             <a:ext cx="997527" cy="997527"/>
           </a:xfrm>
           <a:prstGeom prst="roundRect">
@@ -3155,7 +3202,7 @@
           <a:p>
             <a:pPr algn="ctr"/>
             <a:r>
-              <a:rPr lang="tr-TR" sz="1200" dirty="0" smtClean="0"/>
+              <a:rPr lang="tr-TR" sz="1200" dirty="0"/>
               <a:t>Find current cycle</a:t>
             </a:r>
             <a:endParaRPr lang="tr-TR" sz="1200" dirty="0"/>
@@ -3170,7 +3217,7 @@
         </p:nvSpPr>
         <p:spPr>
           <a:xfrm>
-            <a:off x="3643747" y="390235"/>
+            <a:off x="4155939" y="312312"/>
             <a:ext cx="997527" cy="997527"/>
           </a:xfrm>
           <a:prstGeom prst="roundRect">
@@ -3197,7 +3244,7 @@
           <a:p>
             <a:pPr algn="ctr"/>
             <a:r>
-              <a:rPr lang="tr-TR" sz="800" dirty="0" smtClean="0"/>
+              <a:rPr lang="tr-TR" sz="800" dirty="0"/>
               <a:t>Set payment_cycle to args.initial_cycle</a:t>
             </a:r>
             <a:endParaRPr lang="tr-TR" sz="800" dirty="0"/>
@@ -3215,7 +3262,7 @@
         </p:nvCxnSpPr>
         <p:spPr>
           <a:xfrm>
-            <a:off x="3177310" y="888999"/>
+            <a:off x="3689502" y="811074"/>
             <a:ext cx="466437" cy="0"/>
           </a:xfrm>
           <a:prstGeom prst="straightConnector1">
@@ -3248,7 +3295,7 @@
         </p:nvSpPr>
         <p:spPr>
           <a:xfrm>
-            <a:off x="5107711" y="630379"/>
+            <a:off x="5619903" y="552456"/>
             <a:ext cx="517237" cy="517237"/>
           </a:xfrm>
           <a:prstGeom prst="diamond">
@@ -3289,7 +3336,7 @@
         </p:nvCxnSpPr>
         <p:spPr>
           <a:xfrm flipV="1">
-            <a:off x="4641274" y="888998"/>
+            <a:off x="5153466" y="811075"/>
             <a:ext cx="466437" cy="1"/>
           </a:xfrm>
           <a:prstGeom prst="straightConnector1">
@@ -3322,7 +3369,7 @@
         </p:nvSpPr>
         <p:spPr>
           <a:xfrm>
-            <a:off x="4757027" y="293369"/>
+            <a:off x="5269219" y="215444"/>
             <a:ext cx="1218603" cy="230832"/>
           </a:xfrm>
           <a:prstGeom prst="rect">
@@ -3337,7 +3384,7 @@
           <a:lstStyle/>
           <a:p>
             <a:r>
-              <a:rPr lang="tr-TR" sz="900" dirty="0" smtClean="0"/>
+              <a:rPr lang="tr-TR" sz="900" dirty="0"/>
               <a:t>İs payment_cycle &lt;= 0</a:t>
             </a:r>
             <a:endParaRPr lang="tr-TR" sz="900" dirty="0"/>
@@ -3352,7 +3399,7 @@
         </p:nvSpPr>
         <p:spPr>
           <a:xfrm>
-            <a:off x="6188664" y="390235"/>
+            <a:off x="6700856" y="312312"/>
             <a:ext cx="997527" cy="997527"/>
           </a:xfrm>
           <a:prstGeom prst="roundRect">
@@ -3379,7 +3426,7 @@
           <a:p>
             <a:pPr algn="ctr"/>
             <a:r>
-              <a:rPr lang="tr-TR" sz="900" dirty="0" smtClean="0"/>
+              <a:rPr lang="tr-TR" sz="900" dirty="0"/>
               <a:t>Update payment_cycle Using [1]</a:t>
             </a:r>
             <a:endParaRPr lang="tr-TR" sz="900" dirty="0"/>
@@ -3394,7 +3441,7 @@
         </p:nvSpPr>
         <p:spPr>
           <a:xfrm>
-            <a:off x="6188664" y="77925"/>
+            <a:off x="6700854" y="0"/>
             <a:ext cx="3425938" cy="215444"/>
           </a:xfrm>
           <a:prstGeom prst="rect">
@@ -3413,7 +3460,7 @@
               <a:t>p</a:t>
             </a:r>
             <a:r>
-              <a:rPr lang="tr-TR" sz="800" dirty="0" smtClean="0"/>
+              <a:rPr lang="tr-TR" sz="800" dirty="0"/>
               <a:t>ayment_cycle = current cycle - abs(initial_cycle) - (NB_FREEZE_CYCLE+1)   [1]</a:t>
             </a:r>
             <a:endParaRPr lang="tr-TR" sz="800" dirty="0"/>
@@ -3431,7 +3478,7 @@
         </p:nvCxnSpPr>
         <p:spPr>
           <a:xfrm>
-            <a:off x="5624948" y="888998"/>
+            <a:off x="6137138" y="811075"/>
             <a:ext cx="563716" cy="1"/>
           </a:xfrm>
           <a:prstGeom prst="straightConnector1">
@@ -3464,7 +3511,7 @@
         </p:nvSpPr>
         <p:spPr>
           <a:xfrm>
-            <a:off x="6428807" y="1846523"/>
+            <a:off x="6940999" y="1768600"/>
             <a:ext cx="517237" cy="517237"/>
           </a:xfrm>
           <a:prstGeom prst="diamond">
@@ -3505,7 +3552,7 @@
         </p:nvCxnSpPr>
         <p:spPr>
           <a:xfrm flipH="1">
-            <a:off x="6687426" y="1387762"/>
+            <a:off x="7199616" y="1309839"/>
             <a:ext cx="2" cy="458761"/>
           </a:xfrm>
           <a:prstGeom prst="straightConnector1">
@@ -3538,7 +3585,7 @@
         </p:nvSpPr>
         <p:spPr>
           <a:xfrm>
-            <a:off x="6335406" y="1565205"/>
+            <a:off x="6847598" y="1487282"/>
             <a:ext cx="704039" cy="246221"/>
           </a:xfrm>
           <a:prstGeom prst="rect">
@@ -3553,7 +3600,7 @@
           <a:lstStyle/>
           <a:p>
             <a:r>
-              <a:rPr lang="tr-TR" sz="1000" dirty="0" smtClean="0"/>
+              <a:rPr lang="tr-TR" sz="1000" dirty="0"/>
               <a:t>Is exiting?</a:t>
             </a:r>
             <a:endParaRPr lang="tr-TR" sz="1000" dirty="0"/>
@@ -3568,7 +3615,7 @@
         </p:nvSpPr>
         <p:spPr>
           <a:xfrm>
-            <a:off x="8907510" y="384157"/>
+            <a:off x="9419702" y="306234"/>
             <a:ext cx="997527" cy="997527"/>
           </a:xfrm>
           <a:prstGeom prst="roundRect">
@@ -3595,7 +3642,7 @@
           <a:p>
             <a:pPr algn="ctr"/>
             <a:r>
-              <a:rPr lang="tr-TR" sz="1000" dirty="0" smtClean="0"/>
+              <a:rPr lang="tr-TR" sz="1000" dirty="0"/>
               <a:t>Get blockchain head</a:t>
             </a:r>
             <a:endParaRPr lang="tr-TR" sz="1000" dirty="0"/>
@@ -3613,7 +3660,7 @@
         </p:nvCxnSpPr>
         <p:spPr>
           <a:xfrm flipV="1">
-            <a:off x="6946044" y="882921"/>
+            <a:off x="7458234" y="804998"/>
             <a:ext cx="1961466" cy="1222221"/>
           </a:xfrm>
           <a:prstGeom prst="bentConnector3">
@@ -3648,7 +3695,7 @@
         </p:nvSpPr>
         <p:spPr>
           <a:xfrm>
-            <a:off x="7204660" y="1894414"/>
+            <a:off x="7716850" y="1816489"/>
             <a:ext cx="349776" cy="261610"/>
           </a:xfrm>
           <a:prstGeom prst="rect">
@@ -3663,7 +3710,7 @@
           <a:lstStyle/>
           <a:p>
             <a:r>
-              <a:rPr lang="tr-TR" sz="1100" dirty="0" smtClean="0"/>
+              <a:rPr lang="tr-TR" sz="1100" dirty="0"/>
               <a:t>No</a:t>
             </a:r>
             <a:endParaRPr lang="tr-TR" sz="1100" dirty="0"/>
@@ -3678,7 +3725,7 @@
         </p:nvSpPr>
         <p:spPr>
           <a:xfrm>
-            <a:off x="10628829" y="625093"/>
+            <a:off x="11141021" y="547170"/>
             <a:ext cx="517237" cy="517237"/>
           </a:xfrm>
           <a:prstGeom prst="diamond">
@@ -3719,7 +3766,7 @@
         </p:nvCxnSpPr>
         <p:spPr>
           <a:xfrm>
-            <a:off x="9905037" y="882921"/>
+            <a:off x="10417227" y="804998"/>
             <a:ext cx="723792" cy="791"/>
           </a:xfrm>
           <a:prstGeom prst="straightConnector1">
@@ -3752,7 +3799,7 @@
         </p:nvSpPr>
         <p:spPr>
           <a:xfrm>
-            <a:off x="10358601" y="208730"/>
+            <a:off x="10870791" y="130805"/>
             <a:ext cx="1176282" cy="400110"/>
           </a:xfrm>
           <a:prstGeom prst="rect">
@@ -3767,7 +3814,7 @@
           <a:lstStyle/>
           <a:p>
             <a:r>
-              <a:rPr lang="tr-TR" sz="1000" dirty="0" smtClean="0"/>
+              <a:rPr lang="tr-TR" sz="1000" dirty="0"/>
               <a:t>Is payment_cycle is too far in future?</a:t>
             </a:r>
             <a:endParaRPr lang="tr-TR" sz="1000" dirty="0"/>
@@ -3782,7 +3829,7 @@
         </p:nvSpPr>
         <p:spPr>
           <a:xfrm>
-            <a:off x="8907510" y="1655765"/>
+            <a:off x="9419702" y="1577842"/>
             <a:ext cx="997527" cy="997527"/>
           </a:xfrm>
           <a:prstGeom prst="roundRect">
@@ -3809,7 +3856,7 @@
           <a:p>
             <a:pPr algn="ctr"/>
             <a:r>
-              <a:rPr lang="tr-TR" sz="1400" dirty="0" smtClean="0"/>
+              <a:rPr lang="tr-TR" sz="1400" dirty="0"/>
               <a:t>Wait until cycle ends</a:t>
             </a:r>
             <a:endParaRPr lang="tr-TR" sz="1400" dirty="0"/>
@@ -3827,7 +3874,7 @@
         </p:nvCxnSpPr>
         <p:spPr>
           <a:xfrm flipH="1">
-            <a:off x="10885722" y="1142330"/>
+            <a:off x="11397912" y="1064407"/>
             <a:ext cx="1726" cy="745653"/>
           </a:xfrm>
           <a:prstGeom prst="straightConnector1">
@@ -3860,7 +3907,7 @@
         </p:nvSpPr>
         <p:spPr>
           <a:xfrm>
-            <a:off x="10466970" y="1129379"/>
+            <a:off x="10979160" y="1051454"/>
             <a:ext cx="378630" cy="261610"/>
           </a:xfrm>
           <a:prstGeom prst="rect">
@@ -3875,7 +3922,7 @@
           <a:lstStyle/>
           <a:p>
             <a:r>
-              <a:rPr lang="tr-TR" sz="1100" dirty="0" smtClean="0"/>
+              <a:rPr lang="tr-TR" sz="1100" dirty="0"/>
               <a:t>Yes</a:t>
             </a:r>
             <a:endParaRPr lang="tr-TR" sz="1100" dirty="0"/>
@@ -3893,7 +3940,7 @@
         </p:nvCxnSpPr>
         <p:spPr>
           <a:xfrm rot="10800000" flipV="1">
-            <a:off x="6687426" y="2154528"/>
+            <a:off x="7199616" y="2076605"/>
             <a:ext cx="2220084" cy="209231"/>
           </a:xfrm>
           <a:prstGeom prst="bentConnector4">
@@ -3929,7 +3976,7 @@
         </p:nvSpPr>
         <p:spPr>
           <a:xfrm>
-            <a:off x="8907510" y="2981016"/>
+            <a:off x="9419702" y="2903093"/>
             <a:ext cx="997527" cy="997527"/>
           </a:xfrm>
           <a:prstGeom prst="roundRect">
@@ -3956,7 +4003,7 @@
           <a:p>
             <a:pPr algn="ctr"/>
             <a:r>
-              <a:rPr lang="tr-TR" sz="1400" dirty="0" smtClean="0"/>
+              <a:rPr lang="tr-TR" sz="1400" dirty="0"/>
               <a:t>Wait until target offset</a:t>
             </a:r>
             <a:endParaRPr lang="tr-TR" sz="1400" dirty="0"/>
@@ -3971,7 +4018,7 @@
         </p:nvSpPr>
         <p:spPr>
           <a:xfrm>
-            <a:off x="11359677" y="3233549"/>
+            <a:off x="11871869" y="3155626"/>
             <a:ext cx="517237" cy="517237"/>
           </a:xfrm>
           <a:prstGeom prst="diamond">
@@ -4012,7 +4059,7 @@
         </p:nvCxnSpPr>
         <p:spPr>
           <a:xfrm>
-            <a:off x="11146066" y="883712"/>
+            <a:off x="11658256" y="805789"/>
             <a:ext cx="472230" cy="2349837"/>
           </a:xfrm>
           <a:prstGeom prst="bentConnector2">
@@ -4048,7 +4095,7 @@
         </p:nvCxnSpPr>
         <p:spPr>
           <a:xfrm flipH="1" flipV="1">
-            <a:off x="9905037" y="3479780"/>
+            <a:off x="10417227" y="3401855"/>
             <a:ext cx="1454640" cy="12388"/>
           </a:xfrm>
           <a:prstGeom prst="straightConnector1">
@@ -4081,7 +4128,7 @@
         </p:nvSpPr>
         <p:spPr>
           <a:xfrm>
-            <a:off x="10931627" y="2762693"/>
+            <a:off x="11443817" y="2684768"/>
             <a:ext cx="1373336" cy="400110"/>
           </a:xfrm>
           <a:prstGeom prst="rect">
@@ -4100,7 +4147,7 @@
               <a:t>I</a:t>
             </a:r>
             <a:r>
-              <a:rPr lang="tr-TR" sz="1000" dirty="0" smtClean="0"/>
+              <a:rPr lang="tr-TR" sz="1000" dirty="0"/>
               <a:t>s current level &lt; args.payment_offset</a:t>
             </a:r>
             <a:endParaRPr lang="tr-TR" sz="1000" dirty="0"/>
@@ -4115,7 +4162,7 @@
         </p:nvSpPr>
         <p:spPr>
           <a:xfrm>
-            <a:off x="10997436" y="3266307"/>
+            <a:off x="11509626" y="3188382"/>
             <a:ext cx="378630" cy="261610"/>
           </a:xfrm>
           <a:prstGeom prst="rect">
@@ -4130,7 +4177,7 @@
           <a:lstStyle/>
           <a:p>
             <a:r>
-              <a:rPr lang="tr-TR" sz="1100" dirty="0" smtClean="0"/>
+              <a:rPr lang="tr-TR" sz="1100" dirty="0"/>
               <a:t>Yes</a:t>
             </a:r>
             <a:endParaRPr lang="tr-TR" sz="1100" dirty="0"/>
@@ -4148,7 +4195,7 @@
         </p:nvCxnSpPr>
         <p:spPr>
           <a:xfrm rot="10800000">
-            <a:off x="6687426" y="2363760"/>
+            <a:off x="7199616" y="2285835"/>
             <a:ext cx="2220084" cy="1116020"/>
           </a:xfrm>
           <a:prstGeom prst="bentConnector2">
@@ -4181,7 +4228,7 @@
         </p:nvSpPr>
         <p:spPr>
           <a:xfrm>
-            <a:off x="3446292" y="4321728"/>
+            <a:off x="3958484" y="4243805"/>
             <a:ext cx="997527" cy="997527"/>
           </a:xfrm>
           <a:prstGeom prst="roundRect">
@@ -4209,97 +4256,16 @@
             <a:pPr algn="ctr"/>
             <a:r>
               <a:rPr lang="tr-TR" sz="1400" dirty="0" smtClean="0"/>
-              <a:t>Create exit payment</a:t>
+              <a:t>Push </a:t>
+            </a:r>
+            <a:r>
+              <a:rPr lang="tr-TR" sz="1400" dirty="0"/>
+              <a:t>exit payment</a:t>
             </a:r>
             <a:endParaRPr lang="tr-TR" sz="1400" dirty="0"/>
           </a:p>
         </p:txBody>
       </p:sp>
-      <p:sp>
-        <p:nvSpPr>
-          <p:cNvPr id="70" name="Rounded Rectangle 69"/>
-          <p:cNvSpPr/>
-          <p:nvPr/>
-        </p:nvSpPr>
-        <p:spPr>
-          <a:xfrm>
-            <a:off x="11119531" y="3994927"/>
-            <a:ext cx="997527" cy="997527"/>
-          </a:xfrm>
-          <a:prstGeom prst="roundRect">
-            <a:avLst/>
-          </a:prstGeom>
-        </p:spPr>
-        <p:style>
-          <a:lnRef idx="2">
-            <a:schemeClr val="dk1"/>
-          </a:lnRef>
-          <a:fillRef idx="1">
-            <a:schemeClr val="lt1"/>
-          </a:fillRef>
-          <a:effectRef idx="0">
-            <a:schemeClr val="dk1"/>
-          </a:effectRef>
-          <a:fontRef idx="minor">
-            <a:schemeClr val="dk1"/>
-          </a:fontRef>
-        </p:style>
-        <p:txBody>
-          <a:bodyPr rtlCol="0" anchor="ctr"/>
-          <a:lstStyle/>
-          <a:p>
-            <a:pPr algn="ctr"/>
-            <a:r>
-              <a:rPr lang="tr-TR" sz="1400" dirty="0" smtClean="0"/>
-              <a:t>Do payment</a:t>
-            </a:r>
-          </a:p>
-          <a:p>
-            <a:pPr algn="ctr"/>
-            <a:r>
-              <a:rPr lang="tr-TR" sz="1400" dirty="0" smtClean="0"/>
-              <a:t>Process</a:t>
-            </a:r>
-            <a:endParaRPr lang="tr-TR" sz="1400" dirty="0"/>
-          </a:p>
-        </p:txBody>
-      </p:sp>
-      <p:cxnSp>
-        <p:nvCxnSpPr>
-          <p:cNvPr id="72" name="Straight Arrow Connector 71"/>
-          <p:cNvCxnSpPr>
-            <a:stCxn id="51" idx="2"/>
-            <a:endCxn id="70" idx="0"/>
-          </p:cNvCxnSpPr>
-          <p:nvPr/>
-        </p:nvCxnSpPr>
-        <p:spPr>
-          <a:xfrm flipH="1">
-            <a:off x="11618295" y="3750786"/>
-            <a:ext cx="1" cy="244141"/>
-          </a:xfrm>
-          <a:prstGeom prst="straightConnector1">
-            <a:avLst/>
-          </a:prstGeom>
-          <a:ln>
-            <a:tailEnd type="triangle"/>
-          </a:ln>
-        </p:spPr>
-        <p:style>
-          <a:lnRef idx="1">
-            <a:schemeClr val="accent1"/>
-          </a:lnRef>
-          <a:fillRef idx="0">
-            <a:schemeClr val="accent1"/>
-          </a:fillRef>
-          <a:effectRef idx="0">
-            <a:schemeClr val="accent1"/>
-          </a:effectRef>
-          <a:fontRef idx="minor">
-            <a:schemeClr val="tx1"/>
-          </a:fontRef>
-        </p:style>
-      </p:cxnSp>
       <p:sp>
         <p:nvSpPr>
           <p:cNvPr id="75" name="Diamond 74"/>
@@ -4308,7 +4274,7 @@
         </p:nvSpPr>
         <p:spPr>
           <a:xfrm>
-            <a:off x="9638357" y="4222681"/>
+            <a:off x="10150549" y="4144758"/>
             <a:ext cx="517237" cy="517237"/>
           </a:xfrm>
           <a:prstGeom prst="diamond">
@@ -4342,15 +4308,14 @@
         <p:nvCxnSpPr>
           <p:cNvPr id="77" name="Straight Arrow Connector 76"/>
           <p:cNvCxnSpPr>
-            <a:stCxn id="70" idx="1"/>
             <a:endCxn id="75" idx="3"/>
           </p:cNvCxnSpPr>
           <p:nvPr/>
         </p:nvCxnSpPr>
         <p:spPr>
           <a:xfrm flipH="1" flipV="1">
-            <a:off x="10155594" y="4481300"/>
-            <a:ext cx="963937" cy="12391"/>
+            <a:off x="10667786" y="4403377"/>
+            <a:ext cx="2044929" cy="15139"/>
           </a:xfrm>
           <a:prstGeom prst="straightConnector1">
             <a:avLst/>
@@ -4382,7 +4347,7 @@
         </p:nvSpPr>
         <p:spPr>
           <a:xfrm>
-            <a:off x="10241288" y="4232081"/>
+            <a:off x="10753478" y="4154156"/>
             <a:ext cx="538930" cy="261610"/>
           </a:xfrm>
           <a:prstGeom prst="rect">
@@ -4397,7 +4362,7 @@
           <a:lstStyle/>
           <a:p>
             <a:r>
-              <a:rPr lang="tr-TR" sz="1050" dirty="0" smtClean="0"/>
+              <a:rPr lang="tr-TR" sz="1050" dirty="0"/>
               <a:t>Result</a:t>
             </a:r>
             <a:endParaRPr lang="tr-TR" sz="1050" dirty="0"/>
@@ -4415,7 +4380,7 @@
         </p:nvCxnSpPr>
         <p:spPr>
           <a:xfrm rot="10800000">
-            <a:off x="6687427" y="2363760"/>
+            <a:off x="7199619" y="2285835"/>
             <a:ext cx="2950931" cy="2117540"/>
           </a:xfrm>
           <a:prstGeom prst="bentConnector2">
@@ -4448,7 +4413,7 @@
         </p:nvSpPr>
         <p:spPr>
           <a:xfrm>
-            <a:off x="9252902" y="4232081"/>
+            <a:off x="9765094" y="4154158"/>
             <a:ext cx="395365" cy="276999"/>
           </a:xfrm>
           <a:prstGeom prst="rect">
@@ -4463,7 +4428,7 @@
           <a:lstStyle/>
           <a:p>
             <a:r>
-              <a:rPr lang="tr-TR" sz="1200" dirty="0" smtClean="0"/>
+              <a:rPr lang="tr-TR" sz="1200" dirty="0"/>
               <a:t>Fail</a:t>
             </a:r>
             <a:endParaRPr lang="tr-TR" sz="1200" dirty="0"/>
@@ -4478,7 +4443,7 @@
         </p:nvSpPr>
         <p:spPr>
           <a:xfrm>
-            <a:off x="6188664" y="4868552"/>
+            <a:off x="6700856" y="4790629"/>
             <a:ext cx="997527" cy="997527"/>
           </a:xfrm>
           <a:prstGeom prst="roundRect">
@@ -4505,7 +4470,7 @@
           <a:p>
             <a:pPr algn="ctr"/>
             <a:r>
-              <a:rPr lang="tr-TR" sz="900" dirty="0" smtClean="0"/>
+              <a:rPr lang="tr-TR" sz="900" dirty="0"/>
               <a:t>Increment payment_cycle</a:t>
             </a:r>
             <a:endParaRPr lang="tr-TR" sz="900" dirty="0"/>
@@ -4520,7 +4485,7 @@
         </p:nvSpPr>
         <p:spPr>
           <a:xfrm>
-            <a:off x="9648267" y="5108696"/>
+            <a:off x="10160459" y="5030773"/>
             <a:ext cx="517237" cy="517237"/>
           </a:xfrm>
           <a:prstGeom prst="diamond">
@@ -4561,7 +4526,7 @@
         </p:nvCxnSpPr>
         <p:spPr>
           <a:xfrm>
-            <a:off x="9896976" y="4739918"/>
+            <a:off x="10409166" y="4661993"/>
             <a:ext cx="9910" cy="368778"/>
           </a:xfrm>
           <a:prstGeom prst="straightConnector1">
@@ -4597,7 +4562,7 @@
         </p:nvCxnSpPr>
         <p:spPr>
           <a:xfrm flipH="1">
-            <a:off x="7186191" y="5367315"/>
+            <a:off x="7698381" y="5289392"/>
             <a:ext cx="2462076" cy="1"/>
           </a:xfrm>
           <a:prstGeom prst="straightConnector1">
@@ -4633,7 +4598,7 @@
         </p:nvCxnSpPr>
         <p:spPr>
           <a:xfrm flipH="1" flipV="1">
-            <a:off x="6687426" y="2363760"/>
+            <a:off x="7199616" y="2285835"/>
             <a:ext cx="2" cy="2504792"/>
           </a:xfrm>
           <a:prstGeom prst="straightConnector1">
@@ -4669,7 +4634,7 @@
         </p:nvCxnSpPr>
         <p:spPr>
           <a:xfrm rot="5400000" flipH="1">
-            <a:off x="6772632" y="2491679"/>
+            <a:off x="7284822" y="2413754"/>
             <a:ext cx="306678" cy="5961830"/>
           </a:xfrm>
           <a:prstGeom prst="bentConnector3">
@@ -4704,7 +4669,7 @@
         </p:nvSpPr>
         <p:spPr>
           <a:xfrm>
-            <a:off x="7435646" y="5922810"/>
+            <a:off x="7947836" y="5844885"/>
             <a:ext cx="2307042" cy="253916"/>
           </a:xfrm>
           <a:prstGeom prst="rect">
@@ -4719,7 +4684,7 @@
           <a:lstStyle/>
           <a:p>
             <a:r>
-              <a:rPr lang="tr-TR" sz="1050" dirty="0" smtClean="0"/>
+              <a:rPr lang="tr-TR" sz="1050" dirty="0"/>
               <a:t>args.run_mode == RunMode.ONETIME</a:t>
             </a:r>
             <a:endParaRPr lang="tr-TR" sz="1050" dirty="0"/>
@@ -4734,7 +4699,7 @@
         </p:nvSpPr>
         <p:spPr>
           <a:xfrm>
-            <a:off x="10627103" y="1887983"/>
+            <a:off x="11139295" y="1810060"/>
             <a:ext cx="517237" cy="517237"/>
           </a:xfrm>
           <a:prstGeom prst="diamond">
@@ -4775,7 +4740,7 @@
         </p:nvCxnSpPr>
         <p:spPr>
           <a:xfrm flipH="1">
-            <a:off x="9905037" y="2146602"/>
+            <a:off x="10417227" y="2068679"/>
             <a:ext cx="722066" cy="7927"/>
           </a:xfrm>
           <a:prstGeom prst="straightConnector1">
@@ -4808,7 +4773,7 @@
         </p:nvSpPr>
         <p:spPr>
           <a:xfrm>
-            <a:off x="7797468" y="6581559"/>
+            <a:off x="8309658" y="6503634"/>
             <a:ext cx="2294218" cy="253916"/>
           </a:xfrm>
           <a:prstGeom prst="rect">
@@ -4823,7 +4788,7 @@
           <a:lstStyle/>
           <a:p>
             <a:r>
-              <a:rPr lang="tr-TR" sz="1050" dirty="0" smtClean="0"/>
+              <a:rPr lang="tr-TR" sz="1050" dirty="0"/>
               <a:t>args.run_mode == RunMode.PENDING</a:t>
             </a:r>
             <a:endParaRPr lang="tr-TR" sz="1050" dirty="0"/>
@@ -4838,7 +4803,7 @@
         </p:nvSpPr>
         <p:spPr>
           <a:xfrm>
-            <a:off x="4692374" y="2615329"/>
+            <a:off x="5204566" y="2537406"/>
             <a:ext cx="997527" cy="997527"/>
           </a:xfrm>
           <a:prstGeom prst="roundRect">
@@ -4869,7 +4834,7 @@
               <a:t>e</a:t>
             </a:r>
             <a:r>
-              <a:rPr lang="tr-TR" sz="1200" dirty="0" smtClean="0"/>
+              <a:rPr lang="tr-TR" sz="1200" dirty="0"/>
               <a:t>xiting = true</a:t>
             </a:r>
             <a:endParaRPr lang="tr-TR" sz="1200" dirty="0"/>
@@ -4887,7 +4852,7 @@
         </p:nvCxnSpPr>
         <p:spPr>
           <a:xfrm rot="5400000" flipH="1" flipV="1">
-            <a:off x="3714898" y="3344252"/>
+            <a:off x="4227090" y="3266327"/>
             <a:ext cx="1207635" cy="747318"/>
           </a:xfrm>
           <a:prstGeom prst="bentConnector2">
@@ -4923,7 +4888,7 @@
         </p:nvCxnSpPr>
         <p:spPr>
           <a:xfrm flipV="1">
-            <a:off x="5689901" y="2363760"/>
+            <a:off x="6202093" y="2285837"/>
             <a:ext cx="997525" cy="750333"/>
           </a:xfrm>
           <a:prstGeom prst="bentConnector2">
@@ -4959,7 +4924,7 @@
         </p:nvCxnSpPr>
         <p:spPr>
           <a:xfrm flipV="1">
-            <a:off x="948460" y="888999"/>
+            <a:off x="1460652" y="811076"/>
             <a:ext cx="1231323" cy="1"/>
           </a:xfrm>
           <a:prstGeom prst="straightConnector1">
@@ -4995,7 +4960,7 @@
         </p:nvCxnSpPr>
         <p:spPr>
           <a:xfrm flipH="1">
-            <a:off x="5542748" y="2105142"/>
+            <a:off x="6054940" y="2027217"/>
             <a:ext cx="886059" cy="11876"/>
           </a:xfrm>
           <a:prstGeom prst="straightConnector1">
@@ -5031,7 +4996,7 @@
         </p:nvCxnSpPr>
         <p:spPr>
           <a:xfrm rot="16200000" flipH="1">
-            <a:off x="5677425" y="836521"/>
+            <a:off x="6189617" y="758596"/>
             <a:ext cx="698907" cy="1321096"/>
           </a:xfrm>
           <a:prstGeom prst="bentConnector3">
@@ -5064,7 +5029,7 @@
         </p:nvSpPr>
         <p:spPr>
           <a:xfrm>
-            <a:off x="5724776" y="666891"/>
+            <a:off x="6236966" y="588966"/>
             <a:ext cx="378630" cy="261610"/>
           </a:xfrm>
           <a:prstGeom prst="rect">
@@ -5079,7 +5044,7 @@
           <a:lstStyle/>
           <a:p>
             <a:r>
-              <a:rPr lang="tr-TR" sz="1100" dirty="0" smtClean="0"/>
+              <a:rPr lang="tr-TR" sz="1100" dirty="0"/>
               <a:t>Yes</a:t>
             </a:r>
             <a:endParaRPr lang="tr-TR" sz="1100" dirty="0"/>
@@ -5094,7 +5059,7 @@
         </p:nvSpPr>
         <p:spPr>
           <a:xfrm>
-            <a:off x="5753196" y="1884991"/>
+            <a:off x="6265386" y="1807066"/>
             <a:ext cx="378630" cy="261610"/>
           </a:xfrm>
           <a:prstGeom prst="rect">
@@ -5109,10 +5074,975 @@
           <a:lstStyle/>
           <a:p>
             <a:r>
+              <a:rPr lang="tr-TR" sz="1100" dirty="0"/>
+              <a:t>Yes</a:t>
+            </a:r>
+            <a:endParaRPr lang="tr-TR" sz="1100" dirty="0"/>
+          </a:p>
+        </p:txBody>
+      </p:sp>
+      <p:sp>
+        <p:nvSpPr>
+          <p:cNvPr id="63" name="Rounded Rectangle 62"/>
+          <p:cNvSpPr/>
+          <p:nvPr/>
+        </p:nvSpPr>
+        <p:spPr>
+          <a:xfrm>
+            <a:off x="12887308" y="1134661"/>
+            <a:ext cx="997527" cy="997527"/>
+          </a:xfrm>
+          <a:prstGeom prst="roundRect">
+            <a:avLst/>
+          </a:prstGeom>
+        </p:spPr>
+        <p:style>
+          <a:lnRef idx="2">
+            <a:schemeClr val="dk1"/>
+          </a:lnRef>
+          <a:fillRef idx="1">
+            <a:schemeClr val="lt1"/>
+          </a:fillRef>
+          <a:effectRef idx="0">
+            <a:schemeClr val="dk1"/>
+          </a:effectRef>
+          <a:fontRef idx="minor">
+            <a:schemeClr val="dk1"/>
+          </a:fontRef>
+        </p:style>
+        <p:txBody>
+          <a:bodyPr rtlCol="0" anchor="ctr"/>
+          <a:lstStyle/>
+          <a:p>
+            <a:pPr algn="ctr"/>
+            <a:r>
+              <a:rPr lang="tr-TR" sz="1200" dirty="0"/>
+              <a:t>Check Past Payment</a:t>
+            </a:r>
+            <a:endParaRPr lang="tr-TR" sz="1200" dirty="0"/>
+          </a:p>
+        </p:txBody>
+      </p:sp>
+      <p:sp>
+        <p:nvSpPr>
+          <p:cNvPr id="64" name="Oval 63"/>
+          <p:cNvSpPr>
+            <a:spLocks/>
+          </p:cNvSpPr>
+          <p:nvPr/>
+        </p:nvSpPr>
+        <p:spPr>
+          <a:xfrm>
+            <a:off x="14513468" y="1544157"/>
+            <a:ext cx="189346" cy="189346"/>
+          </a:xfrm>
+          <a:prstGeom prst="ellipse">
+            <a:avLst/>
+          </a:prstGeom>
+        </p:spPr>
+        <p:style>
+          <a:lnRef idx="2">
+            <a:schemeClr val="accent1">
+              <a:shade val="50000"/>
+            </a:schemeClr>
+          </a:lnRef>
+          <a:fillRef idx="1">
+            <a:schemeClr val="accent1"/>
+          </a:fillRef>
+          <a:effectRef idx="0">
+            <a:schemeClr val="accent1"/>
+          </a:effectRef>
+          <a:fontRef idx="minor">
+            <a:schemeClr val="lt1"/>
+          </a:fontRef>
+        </p:style>
+        <p:txBody>
+          <a:bodyPr rtlCol="0" anchor="ctr"/>
+          <a:lstStyle/>
+          <a:p>
+            <a:pPr algn="ctr"/>
+            <a:endParaRPr lang="tr-TR"/>
+          </a:p>
+        </p:txBody>
+      </p:sp>
+      <p:sp>
+        <p:nvSpPr>
+          <p:cNvPr id="69" name="Diamond 68"/>
+          <p:cNvSpPr/>
+          <p:nvPr/>
+        </p:nvSpPr>
+        <p:spPr>
+          <a:xfrm>
+            <a:off x="13127452" y="2479187"/>
+            <a:ext cx="517237" cy="517237"/>
+          </a:xfrm>
+          <a:prstGeom prst="diamond">
+            <a:avLst/>
+          </a:prstGeom>
+        </p:spPr>
+        <p:style>
+          <a:lnRef idx="2">
+            <a:schemeClr val="dk1"/>
+          </a:lnRef>
+          <a:fillRef idx="1">
+            <a:schemeClr val="lt1"/>
+          </a:fillRef>
+          <a:effectRef idx="0">
+            <a:schemeClr val="dk1"/>
+          </a:effectRef>
+          <a:fontRef idx="minor">
+            <a:schemeClr val="dk1"/>
+          </a:fontRef>
+        </p:style>
+        <p:txBody>
+          <a:bodyPr rtlCol="0" anchor="ctr"/>
+          <a:lstStyle/>
+          <a:p>
+            <a:pPr algn="ctr"/>
+            <a:endParaRPr lang="tr-TR"/>
+          </a:p>
+        </p:txBody>
+      </p:sp>
+      <p:cxnSp>
+        <p:nvCxnSpPr>
+          <p:cNvPr id="3" name="Straight Arrow Connector 2"/>
+          <p:cNvCxnSpPr>
+            <a:stCxn id="63" idx="2"/>
+            <a:endCxn id="69" idx="0"/>
+          </p:cNvCxnSpPr>
+          <p:nvPr/>
+        </p:nvCxnSpPr>
+        <p:spPr>
+          <a:xfrm flipH="1">
+            <a:off x="13386071" y="2132188"/>
+            <a:ext cx="1" cy="346999"/>
+          </a:xfrm>
+          <a:prstGeom prst="straightConnector1">
+            <a:avLst/>
+          </a:prstGeom>
+          <a:ln>
+            <a:tailEnd type="triangle"/>
+          </a:ln>
+        </p:spPr>
+        <p:style>
+          <a:lnRef idx="1">
+            <a:schemeClr val="accent1"/>
+          </a:lnRef>
+          <a:fillRef idx="0">
+            <a:schemeClr val="accent1"/>
+          </a:fillRef>
+          <a:effectRef idx="0">
+            <a:schemeClr val="accent1"/>
+          </a:effectRef>
+          <a:fontRef idx="minor">
+            <a:schemeClr val="tx1"/>
+          </a:fontRef>
+        </p:style>
+      </p:cxnSp>
+      <p:sp>
+        <p:nvSpPr>
+          <p:cNvPr id="71" name="TextBox 70"/>
+          <p:cNvSpPr txBox="1"/>
+          <p:nvPr/>
+        </p:nvSpPr>
+        <p:spPr>
+          <a:xfrm>
+            <a:off x="12655744" y="2179082"/>
+            <a:ext cx="1596912" cy="261610"/>
+          </a:xfrm>
+          <a:prstGeom prst="rect">
+            <a:avLst/>
+          </a:prstGeom>
+          <a:noFill/>
+        </p:spPr>
+        <p:txBody>
+          <a:bodyPr wrap="none" rtlCol="0">
+            <a:spAutoFit/>
+          </a:bodyPr>
+          <a:lstStyle/>
+          <a:p>
+            <a:r>
+              <a:rPr lang="tr-TR" sz="1100" dirty="0"/>
+              <a:t>Is </a:t>
+            </a:r>
+            <a:r>
               <a:rPr lang="tr-TR" sz="1100" dirty="0" smtClean="0"/>
+              <a:t>there a </a:t>
+            </a:r>
+            <a:r>
+              <a:rPr lang="tr-TR" sz="1100" dirty="0"/>
+              <a:t>past payment?</a:t>
+            </a:r>
+            <a:endParaRPr lang="tr-TR" sz="1100" dirty="0"/>
+          </a:p>
+        </p:txBody>
+      </p:sp>
+      <p:cxnSp>
+        <p:nvCxnSpPr>
+          <p:cNvPr id="13" name="Straight Arrow Connector 12"/>
+          <p:cNvCxnSpPr>
+            <a:stCxn id="64" idx="2"/>
+            <a:endCxn id="63" idx="3"/>
+          </p:cNvCxnSpPr>
+          <p:nvPr/>
+        </p:nvCxnSpPr>
+        <p:spPr>
+          <a:xfrm flipH="1" flipV="1">
+            <a:off x="13884835" y="1633425"/>
+            <a:ext cx="628633" cy="5405"/>
+          </a:xfrm>
+          <a:prstGeom prst="straightConnector1">
+            <a:avLst/>
+          </a:prstGeom>
+          <a:ln>
+            <a:tailEnd type="triangle"/>
+          </a:ln>
+        </p:spPr>
+        <p:style>
+          <a:lnRef idx="1">
+            <a:schemeClr val="accent1"/>
+          </a:lnRef>
+          <a:fillRef idx="0">
+            <a:schemeClr val="accent1"/>
+          </a:fillRef>
+          <a:effectRef idx="0">
+            <a:schemeClr val="accent1"/>
+          </a:effectRef>
+          <a:fontRef idx="minor">
+            <a:schemeClr val="tx1"/>
+          </a:fontRef>
+        </p:style>
+      </p:cxnSp>
+      <p:sp>
+        <p:nvSpPr>
+          <p:cNvPr id="73" name="Oval 72"/>
+          <p:cNvSpPr>
+            <a:spLocks noChangeAspect="1"/>
+          </p:cNvSpPr>
+          <p:nvPr/>
+        </p:nvSpPr>
+        <p:spPr>
+          <a:xfrm>
+            <a:off x="14739260" y="3296011"/>
+            <a:ext cx="189346" cy="189346"/>
+          </a:xfrm>
+          <a:prstGeom prst="ellipse">
+            <a:avLst/>
+          </a:prstGeom>
+        </p:spPr>
+        <p:style>
+          <a:lnRef idx="2">
+            <a:schemeClr val="accent1"/>
+          </a:lnRef>
+          <a:fillRef idx="1">
+            <a:schemeClr val="lt1"/>
+          </a:fillRef>
+          <a:effectRef idx="0">
+            <a:schemeClr val="accent1"/>
+          </a:effectRef>
+          <a:fontRef idx="minor">
+            <a:schemeClr val="dk1"/>
+          </a:fontRef>
+        </p:style>
+        <p:txBody>
+          <a:bodyPr rtlCol="0" anchor="ctr"/>
+          <a:lstStyle/>
+          <a:p>
+            <a:pPr algn="ctr"/>
+            <a:endParaRPr lang="tr-TR"/>
+          </a:p>
+        </p:txBody>
+      </p:sp>
+      <p:sp>
+        <p:nvSpPr>
+          <p:cNvPr id="74" name="Oval 73"/>
+          <p:cNvSpPr>
+            <a:spLocks noChangeAspect="1"/>
+          </p:cNvSpPr>
+          <p:nvPr/>
+        </p:nvSpPr>
+        <p:spPr>
+          <a:xfrm>
+            <a:off x="14787370" y="3344116"/>
+            <a:ext cx="94673" cy="94673"/>
+          </a:xfrm>
+          <a:prstGeom prst="ellipse">
+            <a:avLst/>
+          </a:prstGeom>
+        </p:spPr>
+        <p:style>
+          <a:lnRef idx="2">
+            <a:schemeClr val="accent1">
+              <a:shade val="50000"/>
+            </a:schemeClr>
+          </a:lnRef>
+          <a:fillRef idx="1">
+            <a:schemeClr val="accent1"/>
+          </a:fillRef>
+          <a:effectRef idx="0">
+            <a:schemeClr val="accent1"/>
+          </a:effectRef>
+          <a:fontRef idx="minor">
+            <a:schemeClr val="lt1"/>
+          </a:fontRef>
+        </p:style>
+        <p:txBody>
+          <a:bodyPr rtlCol="0" anchor="ctr"/>
+          <a:lstStyle/>
+          <a:p>
+            <a:pPr algn="ctr"/>
+            <a:endParaRPr lang="tr-TR"/>
+          </a:p>
+        </p:txBody>
+      </p:sp>
+      <p:cxnSp>
+        <p:nvCxnSpPr>
+          <p:cNvPr id="17" name="Elbow Connector 16"/>
+          <p:cNvCxnSpPr>
+            <a:endCxn id="74" idx="0"/>
+          </p:cNvCxnSpPr>
+          <p:nvPr/>
+        </p:nvCxnSpPr>
+        <p:spPr>
+          <a:xfrm>
+            <a:off x="13641520" y="2747431"/>
+            <a:ext cx="1193186" cy="596685"/>
+          </a:xfrm>
+          <a:prstGeom prst="bentConnector2">
+            <a:avLst/>
+          </a:prstGeom>
+          <a:ln>
+            <a:tailEnd type="triangle"/>
+          </a:ln>
+        </p:spPr>
+        <p:style>
+          <a:lnRef idx="1">
+            <a:schemeClr val="accent1"/>
+          </a:lnRef>
+          <a:fillRef idx="0">
+            <a:schemeClr val="accent1"/>
+          </a:fillRef>
+          <a:effectRef idx="0">
+            <a:schemeClr val="accent1"/>
+          </a:effectRef>
+          <a:fontRef idx="minor">
+            <a:schemeClr val="tx1"/>
+          </a:fontRef>
+        </p:style>
+      </p:cxnSp>
+      <p:sp>
+        <p:nvSpPr>
+          <p:cNvPr id="79" name="TextBox 78"/>
+          <p:cNvSpPr txBox="1"/>
+          <p:nvPr/>
+        </p:nvSpPr>
+        <p:spPr>
+          <a:xfrm>
+            <a:off x="13930403" y="2517336"/>
+            <a:ext cx="378630" cy="261610"/>
+          </a:xfrm>
+          <a:prstGeom prst="rect">
+            <a:avLst/>
+          </a:prstGeom>
+          <a:noFill/>
+        </p:spPr>
+        <p:txBody>
+          <a:bodyPr wrap="none" rtlCol="0">
+            <a:spAutoFit/>
+          </a:bodyPr>
+          <a:lstStyle/>
+          <a:p>
+            <a:r>
+              <a:rPr lang="tr-TR" sz="1100" dirty="0"/>
               <a:t>Yes</a:t>
             </a:r>
             <a:endParaRPr lang="tr-TR" sz="1100" dirty="0"/>
+          </a:p>
+        </p:txBody>
+      </p:sp>
+      <p:sp>
+        <p:nvSpPr>
+          <p:cNvPr id="80" name="Rounded Rectangle 79"/>
+          <p:cNvSpPr/>
+          <p:nvPr/>
+        </p:nvSpPr>
+        <p:spPr>
+          <a:xfrm>
+            <a:off x="12887308" y="3219415"/>
+            <a:ext cx="997527" cy="997527"/>
+          </a:xfrm>
+          <a:prstGeom prst="roundRect">
+            <a:avLst/>
+          </a:prstGeom>
+        </p:spPr>
+        <p:style>
+          <a:lnRef idx="2">
+            <a:schemeClr val="dk1"/>
+          </a:lnRef>
+          <a:fillRef idx="1">
+            <a:schemeClr val="lt1"/>
+          </a:fillRef>
+          <a:effectRef idx="0">
+            <a:schemeClr val="dk1"/>
+          </a:effectRef>
+          <a:fontRef idx="minor">
+            <a:schemeClr val="dk1"/>
+          </a:fontRef>
+        </p:style>
+        <p:txBody>
+          <a:bodyPr rtlCol="0" anchor="ctr"/>
+          <a:lstStyle/>
+          <a:p>
+            <a:pPr algn="ctr"/>
+            <a:r>
+              <a:rPr lang="tr-TR" sz="1200" dirty="0"/>
+              <a:t>Fetch Reward Data</a:t>
+            </a:r>
+            <a:endParaRPr lang="tr-TR" sz="1200" dirty="0"/>
+          </a:p>
+        </p:txBody>
+      </p:sp>
+      <p:cxnSp>
+        <p:nvCxnSpPr>
+          <p:cNvPr id="21" name="Straight Arrow Connector 20"/>
+          <p:cNvCxnSpPr>
+            <a:stCxn id="69" idx="2"/>
+            <a:endCxn id="80" idx="0"/>
+          </p:cNvCxnSpPr>
+          <p:nvPr/>
+        </p:nvCxnSpPr>
+        <p:spPr>
+          <a:xfrm>
+            <a:off x="13386071" y="2996424"/>
+            <a:ext cx="1" cy="222991"/>
+          </a:xfrm>
+          <a:prstGeom prst="straightConnector1">
+            <a:avLst/>
+          </a:prstGeom>
+          <a:ln>
+            <a:tailEnd type="triangle"/>
+          </a:ln>
+        </p:spPr>
+        <p:style>
+          <a:lnRef idx="1">
+            <a:schemeClr val="accent1"/>
+          </a:lnRef>
+          <a:fillRef idx="0">
+            <a:schemeClr val="accent1"/>
+          </a:fillRef>
+          <a:effectRef idx="0">
+            <a:schemeClr val="accent1"/>
+          </a:effectRef>
+          <a:fontRef idx="minor">
+            <a:schemeClr val="tx1"/>
+          </a:fontRef>
+        </p:style>
+      </p:cxnSp>
+      <p:sp>
+        <p:nvSpPr>
+          <p:cNvPr id="84" name="Rounded Rectangle 83"/>
+          <p:cNvSpPr/>
+          <p:nvPr/>
+        </p:nvSpPr>
+        <p:spPr>
+          <a:xfrm>
+            <a:off x="12901436" y="4496900"/>
+            <a:ext cx="997527" cy="997527"/>
+          </a:xfrm>
+          <a:prstGeom prst="roundRect">
+            <a:avLst/>
+          </a:prstGeom>
+        </p:spPr>
+        <p:style>
+          <a:lnRef idx="2">
+            <a:schemeClr val="dk1"/>
+          </a:lnRef>
+          <a:fillRef idx="1">
+            <a:schemeClr val="lt1"/>
+          </a:fillRef>
+          <a:effectRef idx="0">
+            <a:schemeClr val="dk1"/>
+          </a:effectRef>
+          <a:fontRef idx="minor">
+            <a:schemeClr val="dk1"/>
+          </a:fontRef>
+        </p:style>
+        <p:txBody>
+          <a:bodyPr rtlCol="0" anchor="ctr"/>
+          <a:lstStyle/>
+          <a:p>
+            <a:pPr algn="ctr"/>
+            <a:r>
+              <a:rPr lang="tr-TR" sz="1200" dirty="0"/>
+              <a:t>Calculate</a:t>
+            </a:r>
+            <a:endParaRPr lang="tr-TR" sz="1200" dirty="0"/>
+          </a:p>
+        </p:txBody>
+      </p:sp>
+      <p:cxnSp>
+        <p:nvCxnSpPr>
+          <p:cNvPr id="29" name="Straight Arrow Connector 28"/>
+          <p:cNvCxnSpPr>
+            <a:stCxn id="80" idx="2"/>
+            <a:endCxn id="84" idx="0"/>
+          </p:cNvCxnSpPr>
+          <p:nvPr/>
+        </p:nvCxnSpPr>
+        <p:spPr>
+          <a:xfrm>
+            <a:off x="13386071" y="4216941"/>
+            <a:ext cx="14128" cy="279958"/>
+          </a:xfrm>
+          <a:prstGeom prst="straightConnector1">
+            <a:avLst/>
+          </a:prstGeom>
+          <a:ln>
+            <a:tailEnd type="triangle"/>
+          </a:ln>
+        </p:spPr>
+        <p:style>
+          <a:lnRef idx="1">
+            <a:schemeClr val="accent1"/>
+          </a:lnRef>
+          <a:fillRef idx="0">
+            <a:schemeClr val="accent1"/>
+          </a:fillRef>
+          <a:effectRef idx="0">
+            <a:schemeClr val="accent1"/>
+          </a:effectRef>
+          <a:fontRef idx="minor">
+            <a:schemeClr val="tx1"/>
+          </a:fontRef>
+        </p:style>
+      </p:cxnSp>
+      <p:sp>
+        <p:nvSpPr>
+          <p:cNvPr id="85" name="Diamond 84"/>
+          <p:cNvSpPr/>
+          <p:nvPr/>
+        </p:nvSpPr>
+        <p:spPr>
+          <a:xfrm>
+            <a:off x="14153271" y="4740506"/>
+            <a:ext cx="517237" cy="517237"/>
+          </a:xfrm>
+          <a:prstGeom prst="diamond">
+            <a:avLst/>
+          </a:prstGeom>
+        </p:spPr>
+        <p:style>
+          <a:lnRef idx="2">
+            <a:schemeClr val="dk1"/>
+          </a:lnRef>
+          <a:fillRef idx="1">
+            <a:schemeClr val="lt1"/>
+          </a:fillRef>
+          <a:effectRef idx="0">
+            <a:schemeClr val="dk1"/>
+          </a:effectRef>
+          <a:fontRef idx="minor">
+            <a:schemeClr val="dk1"/>
+          </a:fontRef>
+        </p:style>
+        <p:txBody>
+          <a:bodyPr rtlCol="0" anchor="ctr"/>
+          <a:lstStyle/>
+          <a:p>
+            <a:pPr algn="ctr"/>
+            <a:endParaRPr lang="tr-TR"/>
+          </a:p>
+        </p:txBody>
+      </p:sp>
+      <p:cxnSp>
+        <p:nvCxnSpPr>
+          <p:cNvPr id="35" name="Straight Arrow Connector 34"/>
+          <p:cNvCxnSpPr>
+            <a:stCxn id="84" idx="3"/>
+            <a:endCxn id="85" idx="1"/>
+          </p:cNvCxnSpPr>
+          <p:nvPr/>
+        </p:nvCxnSpPr>
+        <p:spPr>
+          <a:xfrm>
+            <a:off x="13898962" y="4995664"/>
+            <a:ext cx="254308" cy="3461"/>
+          </a:xfrm>
+          <a:prstGeom prst="straightConnector1">
+            <a:avLst/>
+          </a:prstGeom>
+          <a:ln>
+            <a:tailEnd type="triangle"/>
+          </a:ln>
+        </p:spPr>
+        <p:style>
+          <a:lnRef idx="1">
+            <a:schemeClr val="accent1"/>
+          </a:lnRef>
+          <a:fillRef idx="0">
+            <a:schemeClr val="accent1"/>
+          </a:fillRef>
+          <a:effectRef idx="0">
+            <a:schemeClr val="accent1"/>
+          </a:effectRef>
+          <a:fontRef idx="minor">
+            <a:schemeClr val="tx1"/>
+          </a:fontRef>
+        </p:style>
+      </p:cxnSp>
+      <p:sp>
+        <p:nvSpPr>
+          <p:cNvPr id="90" name="TextBox 89"/>
+          <p:cNvSpPr txBox="1"/>
+          <p:nvPr/>
+        </p:nvSpPr>
+        <p:spPr>
+          <a:xfrm>
+            <a:off x="13869253" y="5232366"/>
+            <a:ext cx="1212191" cy="253916"/>
+          </a:xfrm>
+          <a:prstGeom prst="rect">
+            <a:avLst/>
+          </a:prstGeom>
+          <a:noFill/>
+        </p:spPr>
+        <p:txBody>
+          <a:bodyPr wrap="none" rtlCol="0">
+            <a:spAutoFit/>
+          </a:bodyPr>
+          <a:lstStyle/>
+          <a:p>
+            <a:r>
+              <a:rPr lang="tr-TR" sz="1050" dirty="0"/>
+              <a:t>Is total amount &gt; 0</a:t>
+            </a:r>
+            <a:endParaRPr lang="tr-TR" sz="1050" dirty="0"/>
+          </a:p>
+        </p:txBody>
+      </p:sp>
+      <p:cxnSp>
+        <p:nvCxnSpPr>
+          <p:cNvPr id="40" name="Elbow Connector 39"/>
+          <p:cNvCxnSpPr>
+            <a:stCxn id="85" idx="0"/>
+            <a:endCxn id="74" idx="4"/>
+          </p:cNvCxnSpPr>
+          <p:nvPr/>
+        </p:nvCxnSpPr>
+        <p:spPr>
+          <a:xfrm rot="5400000" flipH="1" flipV="1">
+            <a:off x="13972440" y="3878240"/>
+            <a:ext cx="1301717" cy="422817"/>
+          </a:xfrm>
+          <a:prstGeom prst="bentConnector3">
+            <a:avLst>
+              <a:gd name="adj1" fmla="val 50000"/>
+            </a:avLst>
+          </a:prstGeom>
+          <a:ln>
+            <a:tailEnd type="triangle"/>
+          </a:ln>
+        </p:spPr>
+        <p:style>
+          <a:lnRef idx="1">
+            <a:schemeClr val="accent1"/>
+          </a:lnRef>
+          <a:fillRef idx="0">
+            <a:schemeClr val="accent1"/>
+          </a:fillRef>
+          <a:effectRef idx="0">
+            <a:schemeClr val="accent1"/>
+          </a:effectRef>
+          <a:fontRef idx="minor">
+            <a:schemeClr val="tx1"/>
+          </a:fontRef>
+        </p:style>
+      </p:cxnSp>
+      <p:sp>
+        <p:nvSpPr>
+          <p:cNvPr id="94" name="Rounded Rectangle 93"/>
+          <p:cNvSpPr/>
+          <p:nvPr/>
+        </p:nvSpPr>
+        <p:spPr>
+          <a:xfrm>
+            <a:off x="15126180" y="4499749"/>
+            <a:ext cx="997527" cy="997527"/>
+          </a:xfrm>
+          <a:prstGeom prst="roundRect">
+            <a:avLst/>
+          </a:prstGeom>
+        </p:spPr>
+        <p:style>
+          <a:lnRef idx="2">
+            <a:schemeClr val="dk1"/>
+          </a:lnRef>
+          <a:fillRef idx="1">
+            <a:schemeClr val="lt1"/>
+          </a:fillRef>
+          <a:effectRef idx="0">
+            <a:schemeClr val="dk1"/>
+          </a:effectRef>
+          <a:fontRef idx="minor">
+            <a:schemeClr val="dk1"/>
+          </a:fontRef>
+        </p:style>
+        <p:txBody>
+          <a:bodyPr rtlCol="0" anchor="ctr"/>
+          <a:lstStyle/>
+          <a:p>
+            <a:pPr algn="ctr"/>
+            <a:r>
+              <a:rPr lang="tr-TR" sz="1200" dirty="0" smtClean="0"/>
+              <a:t>Push Payment</a:t>
+            </a:r>
+            <a:endParaRPr lang="tr-TR" sz="1200" dirty="0"/>
+          </a:p>
+        </p:txBody>
+      </p:sp>
+      <p:sp>
+        <p:nvSpPr>
+          <p:cNvPr id="95" name="Rounded Rectangle 94"/>
+          <p:cNvSpPr/>
+          <p:nvPr/>
+        </p:nvSpPr>
+        <p:spPr>
+          <a:xfrm>
+            <a:off x="15126180" y="2845351"/>
+            <a:ext cx="997527" cy="997527"/>
+          </a:xfrm>
+          <a:prstGeom prst="roundRect">
+            <a:avLst/>
+          </a:prstGeom>
+        </p:spPr>
+        <p:style>
+          <a:lnRef idx="2">
+            <a:schemeClr val="dk1"/>
+          </a:lnRef>
+          <a:fillRef idx="1">
+            <a:schemeClr val="lt1"/>
+          </a:fillRef>
+          <a:effectRef idx="0">
+            <a:schemeClr val="dk1"/>
+          </a:effectRef>
+          <a:fontRef idx="minor">
+            <a:schemeClr val="dk1"/>
+          </a:fontRef>
+        </p:style>
+        <p:txBody>
+          <a:bodyPr rtlCol="0" anchor="ctr"/>
+          <a:lstStyle/>
+          <a:p>
+            <a:pPr algn="ctr"/>
+            <a:r>
+              <a:rPr lang="tr-TR" sz="1200" dirty="0" smtClean="0"/>
+              <a:t>Create Calculation Report</a:t>
+            </a:r>
+            <a:endParaRPr lang="tr-TR" sz="1200" dirty="0"/>
+          </a:p>
+        </p:txBody>
+      </p:sp>
+      <p:cxnSp>
+        <p:nvCxnSpPr>
+          <p:cNvPr id="44" name="Straight Arrow Connector 43"/>
+          <p:cNvCxnSpPr>
+            <a:stCxn id="95" idx="1"/>
+            <a:endCxn id="74" idx="7"/>
+          </p:cNvCxnSpPr>
+          <p:nvPr/>
+        </p:nvCxnSpPr>
+        <p:spPr>
+          <a:xfrm flipH="1">
+            <a:off x="14868178" y="3344115"/>
+            <a:ext cx="258002" cy="13866"/>
+          </a:xfrm>
+          <a:prstGeom prst="straightConnector1">
+            <a:avLst/>
+          </a:prstGeom>
+          <a:ln>
+            <a:tailEnd type="triangle"/>
+          </a:ln>
+        </p:spPr>
+        <p:style>
+          <a:lnRef idx="1">
+            <a:schemeClr val="accent1"/>
+          </a:lnRef>
+          <a:fillRef idx="0">
+            <a:schemeClr val="accent1"/>
+          </a:fillRef>
+          <a:effectRef idx="0">
+            <a:schemeClr val="accent1"/>
+          </a:effectRef>
+          <a:fontRef idx="minor">
+            <a:schemeClr val="tx1"/>
+          </a:fontRef>
+        </p:style>
+      </p:cxnSp>
+      <p:cxnSp>
+        <p:nvCxnSpPr>
+          <p:cNvPr id="52" name="Elbow Connector 51"/>
+          <p:cNvCxnSpPr>
+            <a:stCxn id="85" idx="3"/>
+            <a:endCxn id="94" idx="1"/>
+          </p:cNvCxnSpPr>
+          <p:nvPr/>
+        </p:nvCxnSpPr>
+        <p:spPr>
+          <a:xfrm flipV="1">
+            <a:off x="14670508" y="4998513"/>
+            <a:ext cx="455672" cy="612"/>
+          </a:xfrm>
+          <a:prstGeom prst="bentConnector3">
+            <a:avLst/>
+          </a:prstGeom>
+          <a:ln>
+            <a:tailEnd type="triangle"/>
+          </a:ln>
+        </p:spPr>
+        <p:style>
+          <a:lnRef idx="1">
+            <a:schemeClr val="accent1"/>
+          </a:lnRef>
+          <a:fillRef idx="0">
+            <a:schemeClr val="accent1"/>
+          </a:fillRef>
+          <a:effectRef idx="0">
+            <a:schemeClr val="accent1"/>
+          </a:effectRef>
+          <a:fontRef idx="minor">
+            <a:schemeClr val="tx1"/>
+          </a:fontRef>
+        </p:style>
+      </p:cxnSp>
+      <p:cxnSp>
+        <p:nvCxnSpPr>
+          <p:cNvPr id="57" name="Straight Arrow Connector 56"/>
+          <p:cNvCxnSpPr>
+            <a:stCxn id="94" idx="0"/>
+            <a:endCxn id="95" idx="2"/>
+          </p:cNvCxnSpPr>
+          <p:nvPr/>
+        </p:nvCxnSpPr>
+        <p:spPr>
+          <a:xfrm flipV="1">
+            <a:off x="15624944" y="3842878"/>
+            <a:ext cx="0" cy="656871"/>
+          </a:xfrm>
+          <a:prstGeom prst="straightConnector1">
+            <a:avLst/>
+          </a:prstGeom>
+          <a:ln>
+            <a:tailEnd type="triangle"/>
+          </a:ln>
+        </p:spPr>
+        <p:style>
+          <a:lnRef idx="1">
+            <a:schemeClr val="accent1"/>
+          </a:lnRef>
+          <a:fillRef idx="0">
+            <a:schemeClr val="accent1"/>
+          </a:fillRef>
+          <a:effectRef idx="0">
+            <a:schemeClr val="accent1"/>
+          </a:effectRef>
+          <a:fontRef idx="minor">
+            <a:schemeClr val="tx1"/>
+          </a:fontRef>
+        </p:style>
+      </p:cxnSp>
+      <p:sp>
+        <p:nvSpPr>
+          <p:cNvPr id="106" name="TextBox 105"/>
+          <p:cNvSpPr txBox="1"/>
+          <p:nvPr/>
+        </p:nvSpPr>
+        <p:spPr>
+          <a:xfrm>
+            <a:off x="14702814" y="4726323"/>
+            <a:ext cx="378630" cy="261610"/>
+          </a:xfrm>
+          <a:prstGeom prst="rect">
+            <a:avLst/>
+          </a:prstGeom>
+          <a:noFill/>
+        </p:spPr>
+        <p:txBody>
+          <a:bodyPr wrap="none" rtlCol="0">
+            <a:spAutoFit/>
+          </a:bodyPr>
+          <a:lstStyle/>
+          <a:p>
+            <a:r>
+              <a:rPr lang="tr-TR" sz="1100" dirty="0"/>
+              <a:t>Yes</a:t>
+            </a:r>
+            <a:endParaRPr lang="tr-TR" sz="1100" dirty="0"/>
+          </a:p>
+        </p:txBody>
+      </p:sp>
+      <p:cxnSp>
+        <p:nvCxnSpPr>
+          <p:cNvPr id="86" name="Straight Arrow Connector 85"/>
+          <p:cNvCxnSpPr>
+            <a:stCxn id="51" idx="3"/>
+            <a:endCxn id="62" idx="1"/>
+          </p:cNvCxnSpPr>
+          <p:nvPr/>
+        </p:nvCxnSpPr>
+        <p:spPr>
+          <a:xfrm flipV="1">
+            <a:off x="12389106" y="3411885"/>
+            <a:ext cx="311374" cy="2360"/>
+          </a:xfrm>
+          <a:prstGeom prst="straightConnector1">
+            <a:avLst/>
+          </a:prstGeom>
+          <a:ln>
+            <a:tailEnd type="triangle"/>
+          </a:ln>
+        </p:spPr>
+        <p:style>
+          <a:lnRef idx="1">
+            <a:schemeClr val="accent1"/>
+          </a:lnRef>
+          <a:fillRef idx="0">
+            <a:schemeClr val="accent1"/>
+          </a:fillRef>
+          <a:effectRef idx="0">
+            <a:schemeClr val="accent1"/>
+          </a:effectRef>
+          <a:fontRef idx="minor">
+            <a:schemeClr val="tx1"/>
+          </a:fontRef>
+        </p:style>
+      </p:cxnSp>
+      <p:sp>
+        <p:nvSpPr>
+          <p:cNvPr id="118" name="TextBox 117"/>
+          <p:cNvSpPr txBox="1"/>
+          <p:nvPr/>
+        </p:nvSpPr>
+        <p:spPr>
+          <a:xfrm>
+            <a:off x="13222478" y="12624"/>
+            <a:ext cx="1176282" cy="400110"/>
+          </a:xfrm>
+          <a:prstGeom prst="rect">
+            <a:avLst/>
+          </a:prstGeom>
+          <a:noFill/>
+        </p:spPr>
+        <p:txBody>
+          <a:bodyPr wrap="square" rtlCol="0">
+            <a:spAutoFit/>
+          </a:bodyPr>
+          <a:lstStyle/>
+          <a:p>
+            <a:r>
+              <a:rPr lang="tr-TR" sz="1000" dirty="0" smtClean="0"/>
+              <a:t>Create payment Sub-process</a:t>
+            </a:r>
+            <a:endParaRPr lang="tr-TR" sz="1000" dirty="0"/>
           </a:p>
         </p:txBody>
       </p:sp>
@@ -5132,7 +6062,7 @@
 <file path=ppt/theme/theme1.xml><?xml version="1.0" encoding="utf-8"?>
 <a:theme xmlns:a="http://schemas.openxmlformats.org/drawingml/2006/main" name="Office Theme">
   <a:themeElements>
-    <a:clrScheme name="Office">
+    <a:clrScheme name="Office Theme">
       <a:dk1>
         <a:sysClr val="windowText" lastClr="000000"/>
       </a:dk1>
@@ -5170,7 +6100,7 @@
         <a:srgbClr val="954F72"/>
       </a:folHlink>
     </a:clrScheme>
-    <a:fontScheme name="Office">
+    <a:fontScheme name="Office Theme">
       <a:majorFont>
         <a:latin typeface="Calibri Light" panose="020F0302020204030204"/>
         <a:ea typeface=""/>
@@ -5242,7 +6172,7 @@
         <a:font script="Geor" typeface="Sylfaen"/>
       </a:minorFont>
     </a:fontScheme>
-    <a:fmtScheme name="Office">
+    <a:fmtScheme name="Office Theme">
       <a:fillStyleLst>
         <a:solidFill>
           <a:schemeClr val="phClr"/>

</xml_diff>